<commit_message>
more documentation in pcf stuff
</commit_message>
<xml_diff>
--- a/gmx2qmmm_overview.pptx
+++ b/gmx2qmmm_overview.pptx
@@ -62,6 +62,21 @@
     <p:sldId id="314" r:id="rId56"/>
     <p:sldId id="315" r:id="rId57"/>
     <p:sldId id="316" r:id="rId58"/>
+    <p:sldId id="318" r:id="rId59"/>
+    <p:sldId id="319" r:id="rId60"/>
+    <p:sldId id="320" r:id="rId61"/>
+    <p:sldId id="321" r:id="rId62"/>
+    <p:sldId id="322" r:id="rId63"/>
+    <p:sldId id="323" r:id="rId64"/>
+    <p:sldId id="332" r:id="rId65"/>
+    <p:sldId id="324" r:id="rId66"/>
+    <p:sldId id="325" r:id="rId67"/>
+    <p:sldId id="329" r:id="rId68"/>
+    <p:sldId id="326" r:id="rId69"/>
+    <p:sldId id="327" r:id="rId70"/>
+    <p:sldId id="328" r:id="rId71"/>
+    <p:sldId id="330" r:id="rId72"/>
+    <p:sldId id="331" r:id="rId73"/>
   </p:sldIdLst>
   <p:sldSz cx="12192000" cy="6858000"/>
   <p:notesSz cx="6858000" cy="9144000"/>
@@ -219,6 +234,10 @@
           <p14:sldIdLst>
             <p14:sldId id="296"/>
             <p14:sldId id="298"/>
+          </p14:sldIdLst>
+        </p14:section>
+        <p14:section name="generate_charge_shift.py" id="{A3D9FEA4-16B7-4F0E-8C41-59D70825CC48}">
+          <p14:sldIdLst>
             <p14:sldId id="297"/>
             <p14:sldId id="303"/>
             <p14:sldId id="304"/>
@@ -234,6 +253,29 @@
             <p14:sldId id="314"/>
             <p14:sldId id="315"/>
             <p14:sldId id="316"/>
+          </p14:sldIdLst>
+        </p14:section>
+        <p14:section name="generate_pcf_from_top.py" id="{0E5EBCBB-72B7-4712-964E-9371B75B420A}">
+          <p14:sldIdLst>
+            <p14:sldId id="318"/>
+            <p14:sldId id="319"/>
+            <p14:sldId id="320"/>
+            <p14:sldId id="321"/>
+            <p14:sldId id="322"/>
+            <p14:sldId id="323"/>
+            <p14:sldId id="332"/>
+          </p14:sldIdLst>
+        </p14:section>
+        <p14:section name="prepare_pcf_for_shift.py" id="{1A0531EC-002A-4993-8430-FF1A90A86EE0}">
+          <p14:sldIdLst>
+            <p14:sldId id="324"/>
+            <p14:sldId id="325"/>
+            <p14:sldId id="329"/>
+            <p14:sldId id="326"/>
+            <p14:sldId id="327"/>
+            <p14:sldId id="328"/>
+            <p14:sldId id="330"/>
+            <p14:sldId id="331"/>
           </p14:sldIdLst>
         </p14:section>
       </p14:sectionLst>
@@ -394,7 +436,7 @@
           <a:p>
             <a:fld id="{2091139D-9980-4795-B053-8E110504F696}" type="datetimeFigureOut">
               <a:rPr lang="en-US" smtClean="0"/>
-              <a:t>1/28/2024</a:t>
+              <a:t>2/15/2024</a:t>
             </a:fld>
             <a:endParaRPr lang="en-US"/>
           </a:p>
@@ -594,7 +636,7 @@
           <a:p>
             <a:fld id="{2091139D-9980-4795-B053-8E110504F696}" type="datetimeFigureOut">
               <a:rPr lang="en-US" smtClean="0"/>
-              <a:t>1/28/2024</a:t>
+              <a:t>2/15/2024</a:t>
             </a:fld>
             <a:endParaRPr lang="en-US"/>
           </a:p>
@@ -804,7 +846,7 @@
           <a:p>
             <a:fld id="{2091139D-9980-4795-B053-8E110504F696}" type="datetimeFigureOut">
               <a:rPr lang="en-US" smtClean="0"/>
-              <a:t>1/28/2024</a:t>
+              <a:t>2/15/2024</a:t>
             </a:fld>
             <a:endParaRPr lang="en-US"/>
           </a:p>
@@ -1004,7 +1046,7 @@
           <a:p>
             <a:fld id="{2091139D-9980-4795-B053-8E110504F696}" type="datetimeFigureOut">
               <a:rPr lang="en-US" smtClean="0"/>
-              <a:t>1/28/2024</a:t>
+              <a:t>2/15/2024</a:t>
             </a:fld>
             <a:endParaRPr lang="en-US"/>
           </a:p>
@@ -1280,7 +1322,7 @@
           <a:p>
             <a:fld id="{2091139D-9980-4795-B053-8E110504F696}" type="datetimeFigureOut">
               <a:rPr lang="en-US" smtClean="0"/>
-              <a:t>1/28/2024</a:t>
+              <a:t>2/15/2024</a:t>
             </a:fld>
             <a:endParaRPr lang="en-US"/>
           </a:p>
@@ -1548,7 +1590,7 @@
           <a:p>
             <a:fld id="{2091139D-9980-4795-B053-8E110504F696}" type="datetimeFigureOut">
               <a:rPr lang="en-US" smtClean="0"/>
-              <a:t>1/28/2024</a:t>
+              <a:t>2/15/2024</a:t>
             </a:fld>
             <a:endParaRPr lang="en-US"/>
           </a:p>
@@ -1963,7 +2005,7 @@
           <a:p>
             <a:fld id="{2091139D-9980-4795-B053-8E110504F696}" type="datetimeFigureOut">
               <a:rPr lang="en-US" smtClean="0"/>
-              <a:t>1/28/2024</a:t>
+              <a:t>2/15/2024</a:t>
             </a:fld>
             <a:endParaRPr lang="en-US"/>
           </a:p>
@@ -2105,7 +2147,7 @@
           <a:p>
             <a:fld id="{2091139D-9980-4795-B053-8E110504F696}" type="datetimeFigureOut">
               <a:rPr lang="en-US" smtClean="0"/>
-              <a:t>1/28/2024</a:t>
+              <a:t>2/15/2024</a:t>
             </a:fld>
             <a:endParaRPr lang="en-US"/>
           </a:p>
@@ -2218,7 +2260,7 @@
           <a:p>
             <a:fld id="{2091139D-9980-4795-B053-8E110504F696}" type="datetimeFigureOut">
               <a:rPr lang="en-US" smtClean="0"/>
-              <a:t>1/28/2024</a:t>
+              <a:t>2/15/2024</a:t>
             </a:fld>
             <a:endParaRPr lang="en-US"/>
           </a:p>
@@ -2531,7 +2573,7 @@
           <a:p>
             <a:fld id="{2091139D-9980-4795-B053-8E110504F696}" type="datetimeFigureOut">
               <a:rPr lang="en-US" smtClean="0"/>
-              <a:t>1/28/2024</a:t>
+              <a:t>2/15/2024</a:t>
             </a:fld>
             <a:endParaRPr lang="en-US"/>
           </a:p>
@@ -2820,7 +2862,7 @@
           <a:p>
             <a:fld id="{2091139D-9980-4795-B053-8E110504F696}" type="datetimeFigureOut">
               <a:rPr lang="en-US" smtClean="0"/>
-              <a:t>1/28/2024</a:t>
+              <a:t>2/15/2024</a:t>
             </a:fld>
             <a:endParaRPr lang="en-US"/>
           </a:p>
@@ -3063,7 +3105,7 @@
           <a:p>
             <a:fld id="{2091139D-9980-4795-B053-8E110504F696}" type="datetimeFigureOut">
               <a:rPr lang="en-US" smtClean="0"/>
-              <a:t>1/28/2024</a:t>
+              <a:t>2/15/2024</a:t>
             </a:fld>
             <a:endParaRPr lang="en-US"/>
           </a:p>
@@ -13178,51 +13220,6 @@
           </a:prstGeom>
         </p:spPr>
       </p:pic>
-      <p:sp>
-        <p:nvSpPr>
-          <p:cNvPr id="6" name="Textfeld 5">
-            <a:extLst>
-              <a:ext uri="{FF2B5EF4-FFF2-40B4-BE49-F238E27FC236}">
-                <a16:creationId xmlns:a16="http://schemas.microsoft.com/office/drawing/2014/main" id="{3DC3C2A8-56D0-6B59-ECD8-9D325232FF56}"/>
-              </a:ext>
-            </a:extLst>
-          </p:cNvPr>
-          <p:cNvSpPr txBox="1"/>
-          <p:nvPr/>
-        </p:nvSpPr>
-        <p:spPr>
-          <a:xfrm>
-            <a:off x="6095999" y="3131702"/>
-            <a:ext cx="4853111" cy="646331"/>
-          </a:xfrm>
-          <a:prstGeom prst="rect">
-            <a:avLst/>
-          </a:prstGeom>
-          <a:noFill/>
-        </p:spPr>
-        <p:txBody>
-          <a:bodyPr wrap="square" rtlCol="0">
-            <a:spAutoFit/>
-          </a:bodyPr>
-          <a:lstStyle/>
-          <a:p>
-            <a:r>
-              <a:rPr lang="de-DE"/>
-              <a:t>XX replace by </a:t>
-            </a:r>
-          </a:p>
-          <a:p>
-            <a:r>
-              <a:rPr lang="en-US" b="0" i="0">
-                <a:effectLst/>
-                <a:latin typeface="Söhne Mono"/>
-              </a:rPr>
-              <a:t>normalized_vec = np.linalg.norm(vec) ??</a:t>
-            </a:r>
-            <a:endParaRPr lang="en-US"/>
-          </a:p>
-        </p:txBody>
-      </p:sp>
     </p:spTree>
     <p:extLst>
       <p:ext uri="{BB962C8B-B14F-4D97-AF65-F5344CB8AC3E}">
@@ -13737,8 +13734,8 @@
         </p:nvSpPr>
         <p:spPr>
           <a:xfrm>
-            <a:off x="838200" y="1048435"/>
-            <a:ext cx="6096000" cy="369332"/>
+            <a:off x="838199" y="1048435"/>
+            <a:ext cx="7301593" cy="5909310"/>
           </a:xfrm>
           <a:prstGeom prst="rect">
             <a:avLst/>
@@ -13755,6 +13752,169 @@
               <a:rPr lang="en-US" sz="1800"/>
               <a:t>write_new_field_to_disk_listsonly</a:t>
             </a:r>
+          </a:p>
+          <a:p>
+            <a:r>
+              <a:rPr lang="en-US"/>
+              <a:t>    '''</a:t>
+            </a:r>
+          </a:p>
+          <a:p>
+            <a:r>
+              <a:rPr lang="en-US"/>
+              <a:t>    ------------------------------</a:t>
+            </a:r>
+          </a:p>
+          <a:p>
+            <a:r>
+              <a:rPr lang="en-US"/>
+              <a:t>    EFFECT: \\</a:t>
+            </a:r>
+          </a:p>
+          <a:p>
+            <a:r>
+              <a:rPr lang="en-US"/>
+              <a:t>    --------------- </a:t>
+            </a:r>
+          </a:p>
+          <a:p>
+            <a:r>
+              <a:rPr lang="en-US"/>
+              <a:t>   write point charge fiel file</a:t>
+            </a:r>
+          </a:p>
+          <a:p>
+            <a:r>
+              <a:rPr lang="en-US"/>
+              <a:t>    ------------------------------</a:t>
+            </a:r>
+          </a:p>
+          <a:p>
+            <a:r>
+              <a:rPr lang="en-US"/>
+              <a:t>    INPUT: \\</a:t>
+            </a:r>
+          </a:p>
+          <a:p>
+            <a:r>
+              <a:rPr lang="en-US"/>
+              <a:t>    --------------- </a:t>
+            </a:r>
+          </a:p>
+          <a:p>
+            <a:r>
+              <a:rPr lang="en-US" b="0">
+                <a:solidFill>
+                  <a:srgbClr val="9CDCFE"/>
+                </a:solidFill>
+                <a:effectLst/>
+                <a:latin typeface="Consolas" panose="020B0609020204030204" pitchFamily="49" charset="0"/>
+              </a:rPr>
+              <a:t>inp</a:t>
+            </a:r>
+            <a:r>
+              <a:rPr lang="en-US">
+                <a:solidFill>
+                  <a:srgbClr val="CCCCCC"/>
+                </a:solidFill>
+                <a:latin typeface="Consolas" panose="020B0609020204030204" pitchFamily="49" charset="0"/>
+              </a:rPr>
+              <a:t>: list, list, xyzq for all atoms, ‘QM’ for qm atoms</a:t>
+            </a:r>
+          </a:p>
+          <a:p>
+            <a:r>
+              <a:rPr lang="en-US" b="0">
+                <a:solidFill>
+                  <a:srgbClr val="9CDCFE"/>
+                </a:solidFill>
+                <a:effectLst/>
+                <a:latin typeface="Consolas" panose="020B0609020204030204" pitchFamily="49" charset="0"/>
+              </a:rPr>
+              <a:t>ofilename: string, name for pcf file</a:t>
+            </a:r>
+          </a:p>
+          <a:p>
+            <a:r>
+              <a:rPr lang="en-US" b="0">
+                <a:solidFill>
+                  <a:srgbClr val="9CDCFE"/>
+                </a:solidFill>
+                <a:effectLst/>
+                <a:latin typeface="Consolas" panose="020B0609020204030204" pitchFamily="49" charset="0"/>
+              </a:rPr>
+              <a:t>new_field: 2d array, xyzq of new charges</a:t>
+            </a:r>
+          </a:p>
+          <a:p>
+            <a:r>
+              <a:rPr lang="en-US" b="0">
+                <a:solidFill>
+                  <a:srgbClr val="9CDCFE"/>
+                </a:solidFill>
+                <a:effectLst/>
+                <a:latin typeface="Consolas" panose="020B0609020204030204" pitchFamily="49" charset="0"/>
+              </a:rPr>
+              <a:t>getlist: list, m1 atoms</a:t>
+            </a:r>
+          </a:p>
+          <a:p>
+            <a:r>
+              <a:rPr lang="en-US" b="0">
+                <a:solidFill>
+                  <a:srgbClr val="9CDCFE"/>
+                </a:solidFill>
+                <a:effectLst/>
+                <a:latin typeface="Consolas" panose="020B0609020204030204" pitchFamily="49" charset="0"/>
+              </a:rPr>
+              <a:t>m2_nolist: list, m2 atoms</a:t>
+            </a:r>
+            <a:endParaRPr lang="en-US" b="0">
+              <a:solidFill>
+                <a:srgbClr val="CCCCCC"/>
+              </a:solidFill>
+              <a:effectLst/>
+              <a:latin typeface="Consolas" panose="020B0609020204030204" pitchFamily="49" charset="0"/>
+            </a:endParaRPr>
+          </a:p>
+          <a:p>
+            <a:r>
+              <a:rPr lang="en-US"/>
+              <a:t>    ------------------------------</a:t>
+            </a:r>
+          </a:p>
+          <a:p>
+            <a:r>
+              <a:rPr lang="en-US"/>
+              <a:t>    RETURN: \\</a:t>
+            </a:r>
+          </a:p>
+          <a:p>
+            <a:r>
+              <a:rPr lang="en-US"/>
+              <a:t>    --------------- </a:t>
+            </a:r>
+          </a:p>
+          <a:p>
+            <a:r>
+              <a:rPr lang="en-US"/>
+              <a:t>    None</a:t>
+            </a:r>
+          </a:p>
+          <a:p>
+            <a:r>
+              <a:rPr lang="en-US"/>
+              <a:t>    ------------------------------</a:t>
+            </a:r>
+          </a:p>
+          <a:p>
+            <a:r>
+              <a:rPr lang="en-US"/>
+              <a:t>    '''</a:t>
+            </a:r>
+          </a:p>
+          <a:p>
+            <a:endParaRPr lang="en-US" sz="1800"/>
           </a:p>
         </p:txBody>
       </p:sp>
@@ -14831,8 +14991,8 @@
         </p:nvSpPr>
         <p:spPr>
           <a:xfrm>
-            <a:off x="838200" y="1048435"/>
-            <a:ext cx="6096000" cy="369332"/>
+            <a:off x="838199" y="1048435"/>
+            <a:ext cx="7072993" cy="6186309"/>
           </a:xfrm>
           <a:prstGeom prst="rect">
             <a:avLst/>
@@ -14849,6 +15009,185 @@
               <a:rPr lang="en-US" sz="1800"/>
               <a:t>generate_charge_shift_fieldsonly</a:t>
             </a:r>
+          </a:p>
+          <a:p>
+            <a:r>
+              <a:rPr lang="en-US"/>
+              <a:t>    '''</a:t>
+            </a:r>
+          </a:p>
+          <a:p>
+            <a:r>
+              <a:rPr lang="en-US"/>
+              <a:t>    ------------------------------</a:t>
+            </a:r>
+          </a:p>
+          <a:p>
+            <a:r>
+              <a:rPr lang="en-US"/>
+              <a:t>    EFFECT: \\</a:t>
+            </a:r>
+          </a:p>
+          <a:p>
+            <a:r>
+              <a:rPr lang="en-US"/>
+              <a:t>    --------------- </a:t>
+            </a:r>
+          </a:p>
+          <a:p>
+            <a:r>
+              <a:rPr lang="en-US"/>
+              <a:t>   create new pcf</a:t>
+            </a:r>
+          </a:p>
+          <a:p>
+            <a:r>
+              <a:rPr lang="en-US"/>
+              <a:t>    ------------------------------</a:t>
+            </a:r>
+          </a:p>
+          <a:p>
+            <a:r>
+              <a:rPr lang="en-US"/>
+              <a:t>    INPUT: \\</a:t>
+            </a:r>
+          </a:p>
+          <a:p>
+            <a:r>
+              <a:rPr lang="en-US"/>
+              <a:t>    --------------- </a:t>
+            </a:r>
+          </a:p>
+          <a:p>
+            <a:r>
+              <a:rPr lang="en-US"/>
+              <a:t>    </a:t>
+            </a:r>
+            <a:r>
+              <a:rPr lang="en-US" b="0">
+                <a:solidFill>
+                  <a:srgbClr val="9CDCFE"/>
+                </a:solidFill>
+                <a:effectLst/>
+                <a:latin typeface="Consolas" panose="020B0609020204030204" pitchFamily="49" charset="0"/>
+              </a:rPr>
+              <a:t>pcf</a:t>
+            </a:r>
+            <a:r>
+              <a:rPr lang="en-US">
+                <a:solidFill>
+                  <a:srgbClr val="CCCCCC"/>
+                </a:solidFill>
+                <a:latin typeface="Consolas" panose="020B0609020204030204" pitchFamily="49" charset="0"/>
+              </a:rPr>
+              <a:t>: list, xyzq for all atoms, ‘QM’ for qm atoms</a:t>
+            </a:r>
+          </a:p>
+          <a:p>
+            <a:r>
+              <a:rPr lang="en-US" b="0">
+                <a:solidFill>
+                  <a:srgbClr val="9CDCFE"/>
+                </a:solidFill>
+                <a:effectLst/>
+                <a:latin typeface="Consolas" panose="020B0609020204030204" pitchFamily="49" charset="0"/>
+              </a:rPr>
+              <a:t>m1list: list of m1 atom indices</a:t>
+            </a:r>
+          </a:p>
+          <a:p>
+            <a:r>
+              <a:rPr lang="en-US" b="0">
+                <a:solidFill>
+                  <a:srgbClr val="9CDCFE"/>
+                </a:solidFill>
+                <a:effectLst/>
+                <a:latin typeface="Consolas" panose="020B0609020204030204" pitchFamily="49" charset="0"/>
+              </a:rPr>
+              <a:t>qmcoords: list, xyzq for qm atoms</a:t>
+            </a:r>
+          </a:p>
+          <a:p>
+            <a:r>
+              <a:rPr lang="en-US" b="0">
+                <a:solidFill>
+                  <a:srgbClr val="9CDCFE"/>
+                </a:solidFill>
+                <a:effectLst/>
+                <a:latin typeface="Consolas" panose="020B0609020204030204" pitchFamily="49" charset="0"/>
+              </a:rPr>
+              <a:t>m2list: list of m2 atom indices</a:t>
+            </a:r>
+          </a:p>
+          <a:p>
+            <a:r>
+              <a:rPr lang="en-US" b="0">
+                <a:solidFill>
+                  <a:srgbClr val="9CDCFE"/>
+                </a:solidFill>
+                <a:effectLst/>
+                <a:latin typeface="Consolas" panose="020B0609020204030204" pitchFamily="49" charset="0"/>
+              </a:rPr>
+              <a:t>jobname: string, jobname</a:t>
+            </a:r>
+          </a:p>
+          <a:p>
+            <a:r>
+              <a:rPr lang="en-US" b="0">
+                <a:solidFill>
+                  <a:srgbClr val="9CDCFE"/>
+                </a:solidFill>
+                <a:effectLst/>
+                <a:latin typeface="Consolas" panose="020B0609020204030204" pitchFamily="49" charset="0"/>
+              </a:rPr>
+              <a:t>basedir: directory</a:t>
+            </a:r>
+            <a:endParaRPr lang="en-US" b="0">
+              <a:solidFill>
+                <a:srgbClr val="CCCCCC"/>
+              </a:solidFill>
+              <a:effectLst/>
+              <a:latin typeface="Consolas" panose="020B0609020204030204" pitchFamily="49" charset="0"/>
+            </a:endParaRPr>
+          </a:p>
+          <a:p>
+            <a:r>
+              <a:rPr lang="en-US"/>
+              <a:t>    ------------------------------</a:t>
+            </a:r>
+          </a:p>
+          <a:p>
+            <a:r>
+              <a:rPr lang="en-US"/>
+              <a:t>    RETURN: \\</a:t>
+            </a:r>
+          </a:p>
+          <a:p>
+            <a:r>
+              <a:rPr lang="en-US"/>
+              <a:t>    --------------- </a:t>
+            </a:r>
+          </a:p>
+          <a:p>
+            <a:r>
+              <a:rPr lang="en-US"/>
+              <a:t>    None</a:t>
+            </a:r>
+          </a:p>
+          <a:p>
+            <a:r>
+              <a:rPr lang="en-US"/>
+              <a:t>    ------------------------------</a:t>
+            </a:r>
+          </a:p>
+          <a:p>
+            <a:r>
+              <a:rPr lang="en-US"/>
+              <a:t>    '''</a:t>
+            </a:r>
+          </a:p>
+          <a:p>
+            <a:endParaRPr lang="en-US" sz="1800"/>
           </a:p>
         </p:txBody>
       </p:sp>
@@ -14966,6 +15305,422 @@
 </p:sld>
 </file>
 
+<file path=ppt/slides/slide58.xml><?xml version="1.0" encoding="utf-8"?>
+<p:sld xmlns:a="http://schemas.openxmlformats.org/drawingml/2006/main" xmlns:r="http://schemas.openxmlformats.org/officeDocument/2006/relationships" xmlns:p="http://schemas.openxmlformats.org/presentationml/2006/main">
+  <p:cSld>
+    <p:spTree>
+      <p:nvGrpSpPr>
+        <p:cNvPr id="1" name="">
+          <a:extLst>
+            <a:ext uri="{FF2B5EF4-FFF2-40B4-BE49-F238E27FC236}">
+              <a16:creationId xmlns:a16="http://schemas.microsoft.com/office/drawing/2014/main" id="{F0439652-6F59-A811-A4E2-3E7CC66EEBA0}"/>
+            </a:ext>
+          </a:extLst>
+        </p:cNvPr>
+        <p:cNvGrpSpPr/>
+        <p:nvPr/>
+      </p:nvGrpSpPr>
+      <p:grpSpPr>
+        <a:xfrm>
+          <a:off x="0" y="0"/>
+          <a:ext cx="0" cy="0"/>
+          <a:chOff x="0" y="0"/>
+          <a:chExt cx="0" cy="0"/>
+        </a:xfrm>
+      </p:grpSpPr>
+      <p:sp>
+        <p:nvSpPr>
+          <p:cNvPr id="2" name="Titel 1">
+            <a:extLst>
+              <a:ext uri="{FF2B5EF4-FFF2-40B4-BE49-F238E27FC236}">
+                <a16:creationId xmlns:a16="http://schemas.microsoft.com/office/drawing/2014/main" id="{6883CA36-FCA2-6994-C47D-1828869DDF53}"/>
+              </a:ext>
+            </a:extLst>
+          </p:cNvPr>
+          <p:cNvSpPr>
+            <a:spLocks noGrp="1"/>
+          </p:cNvSpPr>
+          <p:nvPr>
+            <p:ph type="ctrTitle"/>
+          </p:nvPr>
+        </p:nvSpPr>
+        <p:spPr/>
+        <p:txBody>
+          <a:bodyPr/>
+          <a:lstStyle/>
+          <a:p>
+            <a:r>
+              <a:rPr lang="de-DE"/>
+              <a:t>generate_pcf_from_top.py</a:t>
+            </a:r>
+          </a:p>
+        </p:txBody>
+      </p:sp>
+      <p:sp>
+        <p:nvSpPr>
+          <p:cNvPr id="4" name="Textfeld 3">
+            <a:extLst>
+              <a:ext uri="{FF2B5EF4-FFF2-40B4-BE49-F238E27FC236}">
+                <a16:creationId xmlns:a16="http://schemas.microsoft.com/office/drawing/2014/main" id="{DCDDB573-B0BE-CA0D-CB5F-97C65DE719D4}"/>
+              </a:ext>
+            </a:extLst>
+          </p:cNvPr>
+          <p:cNvSpPr txBox="1"/>
+          <p:nvPr/>
+        </p:nvSpPr>
+        <p:spPr>
+          <a:xfrm>
+            <a:off x="389684" y="3849634"/>
+            <a:ext cx="11483301" cy="2862322"/>
+          </a:xfrm>
+          <a:prstGeom prst="rect">
+            <a:avLst/>
+          </a:prstGeom>
+          <a:noFill/>
+        </p:spPr>
+        <p:txBody>
+          <a:bodyPr wrap="square">
+            <a:spAutoFit/>
+          </a:bodyPr>
+          <a:lstStyle/>
+          <a:p>
+            <a:r>
+              <a:rPr lang="en-US" b="0">
+                <a:solidFill>
+                  <a:srgbClr val="6A9955"/>
+                </a:solidFill>
+                <a:effectLst/>
+                <a:latin typeface="Consolas" panose="020B0609020204030204" pitchFamily="49" charset="0"/>
+              </a:rPr>
+              <a:t># This will take a gro and top file, and take the point charges from there.</a:t>
+            </a:r>
+            <a:endParaRPr lang="en-US" b="0">
+              <a:solidFill>
+                <a:srgbClr val="CCCCCC"/>
+              </a:solidFill>
+              <a:effectLst/>
+              <a:latin typeface="Consolas" panose="020B0609020204030204" pitchFamily="49" charset="0"/>
+            </a:endParaRPr>
+          </a:p>
+          <a:p>
+            <a:r>
+              <a:rPr lang="en-US" b="0">
+                <a:solidFill>
+                  <a:srgbClr val="6A9955"/>
+                </a:solidFill>
+                <a:effectLst/>
+                <a:latin typeface="Consolas" panose="020B0609020204030204" pitchFamily="49" charset="0"/>
+              </a:rPr>
+              <a:t># THIS IS NOT YET IMPLEMENTED#This list of charges and coordinates will then be trimmed by a set of point charges which then will be concatenated to a charge shift model, like in a QM/MM approach.</a:t>
+            </a:r>
+            <a:endParaRPr lang="en-US" b="0">
+              <a:solidFill>
+                <a:srgbClr val="CCCCCC"/>
+              </a:solidFill>
+              <a:effectLst/>
+              <a:latin typeface="Consolas" panose="020B0609020204030204" pitchFamily="49" charset="0"/>
+            </a:endParaRPr>
+          </a:p>
+          <a:p>
+            <a:r>
+              <a:rPr lang="en-US" b="0">
+                <a:solidFill>
+                  <a:srgbClr val="6A9955"/>
+                </a:solidFill>
+                <a:effectLst/>
+                <a:latin typeface="Consolas" panose="020B0609020204030204" pitchFamily="49" charset="0"/>
+              </a:rPr>
+              <a:t># THIS IS NOT YET IMPLEMENTED#The trimming is optional.</a:t>
+            </a:r>
+            <a:endParaRPr lang="en-US" b="0">
+              <a:solidFill>
+                <a:srgbClr val="CCCCCC"/>
+              </a:solidFill>
+              <a:effectLst/>
+              <a:latin typeface="Consolas" panose="020B0609020204030204" pitchFamily="49" charset="0"/>
+            </a:endParaRPr>
+          </a:p>
+          <a:p>
+            <a:r>
+              <a:rPr lang="en-US" b="0">
+                <a:solidFill>
+                  <a:srgbClr val="6A9955"/>
+                </a:solidFill>
+                <a:effectLst/>
+                <a:latin typeface="Consolas" panose="020B0609020204030204" pitchFamily="49" charset="0"/>
+              </a:rPr>
+              <a:t># will print output list as x y z charge in Angstrom</a:t>
+            </a:r>
+            <a:endParaRPr lang="en-US" b="0">
+              <a:solidFill>
+                <a:srgbClr val="CCCCCC"/>
+              </a:solidFill>
+              <a:effectLst/>
+              <a:latin typeface="Consolas" panose="020B0609020204030204" pitchFamily="49" charset="0"/>
+            </a:endParaRPr>
+          </a:p>
+          <a:p>
+            <a:r>
+              <a:rPr lang="en-US" b="0">
+                <a:solidFill>
+                  <a:srgbClr val="6A9955"/>
+                </a:solidFill>
+                <a:effectLst/>
+                <a:latin typeface="Consolas" panose="020B0609020204030204" pitchFamily="49" charset="0"/>
+              </a:rPr>
+              <a:t># THIS IS NOT YET TRUE#needs input pdb, file containing groups/atoms to trim (format: &lt;number of groups&gt;\n&lt;for each group:&gt;&lt;amount of atoms in group&gt;\n&lt;indices of atoms, one per line&gt;</a:t>
+            </a:r>
+            <a:endParaRPr lang="en-US" b="0">
+              <a:solidFill>
+                <a:srgbClr val="CCCCCC"/>
+              </a:solidFill>
+              <a:effectLst/>
+              <a:latin typeface="Consolas" panose="020B0609020204030204" pitchFamily="49" charset="0"/>
+            </a:endParaRPr>
+          </a:p>
+          <a:p>
+            <a:r>
+              <a:rPr lang="en-US" b="0">
+                <a:solidFill>
+                  <a:srgbClr val="6A9955"/>
+                </a:solidFill>
+                <a:effectLst/>
+                <a:latin typeface="Consolas" panose="020B0609020204030204" pitchFamily="49" charset="0"/>
+              </a:rPr>
+              <a:t># needs input .gro file, input .top file, PCF output file</a:t>
+            </a:r>
+            <a:endParaRPr lang="en-US" b="0">
+              <a:solidFill>
+                <a:srgbClr val="CCCCCC"/>
+              </a:solidFill>
+              <a:effectLst/>
+              <a:latin typeface="Consolas" panose="020B0609020204030204" pitchFamily="49" charset="0"/>
+            </a:endParaRPr>
+          </a:p>
+        </p:txBody>
+      </p:sp>
+    </p:spTree>
+    <p:extLst>
+      <p:ext uri="{BB962C8B-B14F-4D97-AF65-F5344CB8AC3E}">
+        <p14:creationId xmlns:p14="http://schemas.microsoft.com/office/powerpoint/2010/main" val="980365823"/>
+      </p:ext>
+    </p:extLst>
+  </p:cSld>
+  <p:clrMapOvr>
+    <a:masterClrMapping/>
+  </p:clrMapOvr>
+</p:sld>
+</file>
+
+<file path=ppt/slides/slide59.xml><?xml version="1.0" encoding="utf-8"?>
+<p:sld xmlns:a="http://schemas.openxmlformats.org/drawingml/2006/main" xmlns:r="http://schemas.openxmlformats.org/officeDocument/2006/relationships" xmlns:p="http://schemas.openxmlformats.org/presentationml/2006/main">
+  <p:cSld>
+    <p:spTree>
+      <p:nvGrpSpPr>
+        <p:cNvPr id="1" name="">
+          <a:extLst>
+            <a:ext uri="{FF2B5EF4-FFF2-40B4-BE49-F238E27FC236}">
+              <a16:creationId xmlns:a16="http://schemas.microsoft.com/office/drawing/2014/main" id="{C233BD0C-32E1-DB08-5E92-44670760A58B}"/>
+            </a:ext>
+          </a:extLst>
+        </p:cNvPr>
+        <p:cNvGrpSpPr/>
+        <p:nvPr/>
+      </p:nvGrpSpPr>
+      <p:grpSpPr>
+        <a:xfrm>
+          <a:off x="0" y="0"/>
+          <a:ext cx="0" cy="0"/>
+          <a:chOff x="0" y="0"/>
+          <a:chExt cx="0" cy="0"/>
+        </a:xfrm>
+      </p:grpSpPr>
+      <p:sp>
+        <p:nvSpPr>
+          <p:cNvPr id="2" name="Titel 1">
+            <a:extLst>
+              <a:ext uri="{FF2B5EF4-FFF2-40B4-BE49-F238E27FC236}">
+                <a16:creationId xmlns:a16="http://schemas.microsoft.com/office/drawing/2014/main" id="{387E4F5D-D7C1-8E19-CC0E-40C17728FE62}"/>
+              </a:ext>
+            </a:extLst>
+          </p:cNvPr>
+          <p:cNvSpPr>
+            <a:spLocks noGrp="1"/>
+          </p:cNvSpPr>
+          <p:nvPr>
+            <p:ph type="title"/>
+          </p:nvPr>
+        </p:nvSpPr>
+        <p:spPr>
+          <a:xfrm>
+            <a:off x="838200" y="365126"/>
+            <a:ext cx="10515600" cy="558800"/>
+          </a:xfrm>
+        </p:spPr>
+        <p:txBody>
+          <a:bodyPr>
+            <a:normAutofit/>
+          </a:bodyPr>
+          <a:lstStyle/>
+          <a:p>
+            <a:r>
+              <a:rPr lang="de-DE" sz="2000"/>
+              <a:t>generate_pcf_from_top.py</a:t>
+            </a:r>
+            <a:endParaRPr lang="en-US" sz="2000"/>
+          </a:p>
+        </p:txBody>
+      </p:sp>
+      <p:sp>
+        <p:nvSpPr>
+          <p:cNvPr id="5" name="Textfeld 4">
+            <a:extLst>
+              <a:ext uri="{FF2B5EF4-FFF2-40B4-BE49-F238E27FC236}">
+                <a16:creationId xmlns:a16="http://schemas.microsoft.com/office/drawing/2014/main" id="{9E554DEC-A830-025E-A807-72E8F8CB7B6B}"/>
+              </a:ext>
+            </a:extLst>
+          </p:cNvPr>
+          <p:cNvSpPr txBox="1"/>
+          <p:nvPr/>
+        </p:nvSpPr>
+        <p:spPr>
+          <a:xfrm>
+            <a:off x="838200" y="1048435"/>
+            <a:ext cx="6096000" cy="5632311"/>
+          </a:xfrm>
+          <a:prstGeom prst="rect">
+            <a:avLst/>
+          </a:prstGeom>
+          <a:noFill/>
+        </p:spPr>
+        <p:txBody>
+          <a:bodyPr wrap="square">
+            <a:spAutoFit/>
+          </a:bodyPr>
+          <a:lstStyle/>
+          <a:p>
+            <a:r>
+              <a:rPr lang="en-US"/>
+              <a:t>checkformol</a:t>
+            </a:r>
+          </a:p>
+          <a:p>
+            <a:endParaRPr lang="en-US"/>
+          </a:p>
+          <a:p>
+            <a:r>
+              <a:rPr lang="en-US"/>
+              <a:t>    '''</a:t>
+            </a:r>
+          </a:p>
+          <a:p>
+            <a:r>
+              <a:rPr lang="en-US"/>
+              <a:t>    ------------------------------</a:t>
+            </a:r>
+          </a:p>
+          <a:p>
+            <a:r>
+              <a:rPr lang="en-US"/>
+              <a:t>    EFFECT: \\</a:t>
+            </a:r>
+          </a:p>
+          <a:p>
+            <a:r>
+              <a:rPr lang="en-US"/>
+              <a:t>    --------------- </a:t>
+            </a:r>
+          </a:p>
+          <a:p>
+            <a:r>
+              <a:rPr lang="en-US"/>
+              <a:t>    function checks if the molecule (molname) is listed in the topology file</a:t>
+            </a:r>
+          </a:p>
+          <a:p>
+            <a:r>
+              <a:rPr lang="en-US"/>
+              <a:t>    ------------------------------</a:t>
+            </a:r>
+          </a:p>
+          <a:p>
+            <a:r>
+              <a:rPr lang="en-US"/>
+              <a:t>    INPUT: \\</a:t>
+            </a:r>
+          </a:p>
+          <a:p>
+            <a:r>
+              <a:rPr lang="en-US"/>
+              <a:t>    --------------- </a:t>
+            </a:r>
+          </a:p>
+          <a:p>
+            <a:r>
+              <a:rPr lang="en-US"/>
+              <a:t>    molname: string, name of molecule</a:t>
+            </a:r>
+          </a:p>
+          <a:p>
+            <a:r>
+              <a:rPr lang="en-US"/>
+              <a:t>    inp: string, name of topology file</a:t>
+            </a:r>
+          </a:p>
+          <a:p>
+            <a:r>
+              <a:rPr lang="en-US"/>
+              <a:t>    ------------------------------</a:t>
+            </a:r>
+          </a:p>
+          <a:p>
+            <a:r>
+              <a:rPr lang="en-US"/>
+              <a:t>    RETURN: \\</a:t>
+            </a:r>
+          </a:p>
+          <a:p>
+            <a:r>
+              <a:rPr lang="en-US"/>
+              <a:t>    --------------- </a:t>
+            </a:r>
+          </a:p>
+          <a:p>
+            <a:r>
+              <a:rPr lang="en-US"/>
+              <a:t>    correct: -&gt; bool</a:t>
+            </a:r>
+          </a:p>
+          <a:p>
+            <a:r>
+              <a:rPr lang="en-US"/>
+              <a:t>    ------------------------------</a:t>
+            </a:r>
+          </a:p>
+          <a:p>
+            <a:r>
+              <a:rPr lang="en-US"/>
+              <a:t>    '''</a:t>
+            </a:r>
+          </a:p>
+          <a:p>
+            <a:endParaRPr lang="en-US" sz="1800"/>
+          </a:p>
+        </p:txBody>
+      </p:sp>
+    </p:spTree>
+    <p:extLst>
+      <p:ext uri="{BB962C8B-B14F-4D97-AF65-F5344CB8AC3E}">
+        <p14:creationId xmlns:p14="http://schemas.microsoft.com/office/powerpoint/2010/main" val="4288626983"/>
+      </p:ext>
+    </p:extLst>
+  </p:cSld>
+  <p:clrMapOvr>
+    <a:masterClrMapping/>
+  </p:clrMapOvr>
+</p:sld>
+</file>
+
 <file path=ppt/slides/slide6.xml><?xml version="1.0" encoding="utf-8"?>
 <p:sld xmlns:a="http://schemas.openxmlformats.org/drawingml/2006/main" xmlns:r="http://schemas.openxmlformats.org/officeDocument/2006/relationships" xmlns:p="http://schemas.openxmlformats.org/presentationml/2006/main">
   <p:cSld>
@@ -15016,6 +15771,2401 @@
     <p:extLst>
       <p:ext uri="{BB962C8B-B14F-4D97-AF65-F5344CB8AC3E}">
         <p14:creationId xmlns:p14="http://schemas.microsoft.com/office/powerpoint/2010/main" val="4168606697"/>
+      </p:ext>
+    </p:extLst>
+  </p:cSld>
+  <p:clrMapOvr>
+    <a:masterClrMapping/>
+  </p:clrMapOvr>
+</p:sld>
+</file>
+
+<file path=ppt/slides/slide60.xml><?xml version="1.0" encoding="utf-8"?>
+<p:sld xmlns:a="http://schemas.openxmlformats.org/drawingml/2006/main" xmlns:r="http://schemas.openxmlformats.org/officeDocument/2006/relationships" xmlns:p="http://schemas.openxmlformats.org/presentationml/2006/main">
+  <p:cSld>
+    <p:spTree>
+      <p:nvGrpSpPr>
+        <p:cNvPr id="1" name="">
+          <a:extLst>
+            <a:ext uri="{FF2B5EF4-FFF2-40B4-BE49-F238E27FC236}">
+              <a16:creationId xmlns:a16="http://schemas.microsoft.com/office/drawing/2014/main" id="{ED50FCB9-3A99-A8C0-B6FF-D3C5A512A89F}"/>
+            </a:ext>
+          </a:extLst>
+        </p:cNvPr>
+        <p:cNvGrpSpPr/>
+        <p:nvPr/>
+      </p:nvGrpSpPr>
+      <p:grpSpPr>
+        <a:xfrm>
+          <a:off x="0" y="0"/>
+          <a:ext cx="0" cy="0"/>
+          <a:chOff x="0" y="0"/>
+          <a:chExt cx="0" cy="0"/>
+        </a:xfrm>
+      </p:grpSpPr>
+      <p:sp>
+        <p:nvSpPr>
+          <p:cNvPr id="2" name="Titel 1">
+            <a:extLst>
+              <a:ext uri="{FF2B5EF4-FFF2-40B4-BE49-F238E27FC236}">
+                <a16:creationId xmlns:a16="http://schemas.microsoft.com/office/drawing/2014/main" id="{6C6CCB00-279D-073E-4CE4-77D602E13B68}"/>
+              </a:ext>
+            </a:extLst>
+          </p:cNvPr>
+          <p:cNvSpPr>
+            <a:spLocks noGrp="1"/>
+          </p:cNvSpPr>
+          <p:nvPr>
+            <p:ph type="title"/>
+          </p:nvPr>
+        </p:nvSpPr>
+        <p:spPr>
+          <a:xfrm>
+            <a:off x="838200" y="365126"/>
+            <a:ext cx="10515600" cy="558800"/>
+          </a:xfrm>
+        </p:spPr>
+        <p:txBody>
+          <a:bodyPr>
+            <a:normAutofit/>
+          </a:bodyPr>
+          <a:lstStyle/>
+          <a:p>
+            <a:r>
+              <a:rPr lang="de-DE" sz="2000"/>
+              <a:t>generate_pcf_from_top.py</a:t>
+            </a:r>
+            <a:endParaRPr lang="en-US" sz="2000"/>
+          </a:p>
+        </p:txBody>
+      </p:sp>
+      <p:sp>
+        <p:nvSpPr>
+          <p:cNvPr id="5" name="Textfeld 4">
+            <a:extLst>
+              <a:ext uri="{FF2B5EF4-FFF2-40B4-BE49-F238E27FC236}">
+                <a16:creationId xmlns:a16="http://schemas.microsoft.com/office/drawing/2014/main" id="{6E784518-DF79-0633-888B-EE68842394C6}"/>
+              </a:ext>
+            </a:extLst>
+          </p:cNvPr>
+          <p:cNvSpPr txBox="1"/>
+          <p:nvPr/>
+        </p:nvSpPr>
+        <p:spPr>
+          <a:xfrm>
+            <a:off x="838200" y="1048435"/>
+            <a:ext cx="6096000" cy="5909310"/>
+          </a:xfrm>
+          <a:prstGeom prst="rect">
+            <a:avLst/>
+          </a:prstGeom>
+          <a:noFill/>
+        </p:spPr>
+        <p:txBody>
+          <a:bodyPr wrap="square">
+            <a:spAutoFit/>
+          </a:bodyPr>
+          <a:lstStyle/>
+          <a:p>
+            <a:r>
+              <a:rPr lang="en-US"/>
+              <a:t>getincludelist</a:t>
+            </a:r>
+          </a:p>
+          <a:p>
+            <a:r>
+              <a:rPr lang="en-US"/>
+              <a:t>    '''</a:t>
+            </a:r>
+          </a:p>
+          <a:p>
+            <a:r>
+              <a:rPr lang="en-US"/>
+              <a:t>    ------------------------------</a:t>
+            </a:r>
+          </a:p>
+          <a:p>
+            <a:r>
+              <a:rPr lang="en-US"/>
+              <a:t>    EFFECT: \\</a:t>
+            </a:r>
+          </a:p>
+          <a:p>
+            <a:r>
+              <a:rPr lang="en-US"/>
+              <a:t>    --------------- </a:t>
+            </a:r>
+          </a:p>
+          <a:p>
+            <a:r>
+              <a:rPr lang="en-US"/>
+              <a:t>    reads charges for all atoms in a molecule type</a:t>
+            </a:r>
+          </a:p>
+          <a:p>
+            <a:r>
+              <a:rPr lang="en-US"/>
+              <a:t>    ------------------------------</a:t>
+            </a:r>
+          </a:p>
+          <a:p>
+            <a:r>
+              <a:rPr lang="en-US"/>
+              <a:t>    INPUT: \\</a:t>
+            </a:r>
+          </a:p>
+          <a:p>
+            <a:r>
+              <a:rPr lang="en-US"/>
+              <a:t>    --------------- </a:t>
+            </a:r>
+          </a:p>
+          <a:p>
+            <a:r>
+              <a:rPr lang="en-US"/>
+              <a:t>    molvecentry: list with molecule name and amount of this molecule</a:t>
+            </a:r>
+          </a:p>
+          <a:p>
+            <a:r>
+              <a:rPr lang="en-US"/>
+              <a:t>    top: string, name of topology file</a:t>
+            </a:r>
+          </a:p>
+          <a:p>
+            <a:r>
+              <a:rPr lang="en-US"/>
+              <a:t>    gmxtop_path: string, path to grolib</a:t>
+            </a:r>
+          </a:p>
+          <a:p>
+            <a:r>
+              <a:rPr lang="en-US"/>
+              <a:t>    ------------------------------</a:t>
+            </a:r>
+          </a:p>
+          <a:p>
+            <a:r>
+              <a:rPr lang="en-US"/>
+              <a:t>    RETURN: \\</a:t>
+            </a:r>
+          </a:p>
+          <a:p>
+            <a:r>
+              <a:rPr lang="en-US"/>
+              <a:t>    --------------- </a:t>
+            </a:r>
+          </a:p>
+          <a:p>
+            <a:r>
+              <a:rPr lang="en-US"/>
+              <a:t>    finalvec: list of charges for every atom in these molecule types</a:t>
+            </a:r>
+          </a:p>
+          <a:p>
+            <a:r>
+              <a:rPr lang="en-US"/>
+              <a:t>    ------------------------------</a:t>
+            </a:r>
+          </a:p>
+          <a:p>
+            <a:r>
+              <a:rPr lang="en-US"/>
+              <a:t>    '''</a:t>
+            </a:r>
+          </a:p>
+          <a:p>
+            <a:endParaRPr lang="en-US" sz="1800"/>
+          </a:p>
+        </p:txBody>
+      </p:sp>
+    </p:spTree>
+    <p:extLst>
+      <p:ext uri="{BB962C8B-B14F-4D97-AF65-F5344CB8AC3E}">
+        <p14:creationId xmlns:p14="http://schemas.microsoft.com/office/powerpoint/2010/main" val="1420549592"/>
+      </p:ext>
+    </p:extLst>
+  </p:cSld>
+  <p:clrMapOvr>
+    <a:masterClrMapping/>
+  </p:clrMapOvr>
+</p:sld>
+</file>
+
+<file path=ppt/slides/slide61.xml><?xml version="1.0" encoding="utf-8"?>
+<p:sld xmlns:a="http://schemas.openxmlformats.org/drawingml/2006/main" xmlns:r="http://schemas.openxmlformats.org/officeDocument/2006/relationships" xmlns:p="http://schemas.openxmlformats.org/presentationml/2006/main">
+  <p:cSld>
+    <p:spTree>
+      <p:nvGrpSpPr>
+        <p:cNvPr id="1" name="">
+          <a:extLst>
+            <a:ext uri="{FF2B5EF4-FFF2-40B4-BE49-F238E27FC236}">
+              <a16:creationId xmlns:a16="http://schemas.microsoft.com/office/drawing/2014/main" id="{51E06F43-5029-2FE9-193A-B535214E8B79}"/>
+            </a:ext>
+          </a:extLst>
+        </p:cNvPr>
+        <p:cNvGrpSpPr/>
+        <p:nvPr/>
+      </p:nvGrpSpPr>
+      <p:grpSpPr>
+        <a:xfrm>
+          <a:off x="0" y="0"/>
+          <a:ext cx="0" cy="0"/>
+          <a:chOff x="0" y="0"/>
+          <a:chExt cx="0" cy="0"/>
+        </a:xfrm>
+      </p:grpSpPr>
+      <p:sp>
+        <p:nvSpPr>
+          <p:cNvPr id="2" name="Titel 1">
+            <a:extLst>
+              <a:ext uri="{FF2B5EF4-FFF2-40B4-BE49-F238E27FC236}">
+                <a16:creationId xmlns:a16="http://schemas.microsoft.com/office/drawing/2014/main" id="{489790BB-CF16-29F2-F5BD-FEA52AFB555B}"/>
+              </a:ext>
+            </a:extLst>
+          </p:cNvPr>
+          <p:cNvSpPr>
+            <a:spLocks noGrp="1"/>
+          </p:cNvSpPr>
+          <p:nvPr>
+            <p:ph type="title"/>
+          </p:nvPr>
+        </p:nvSpPr>
+        <p:spPr>
+          <a:xfrm>
+            <a:off x="838200" y="365126"/>
+            <a:ext cx="10515600" cy="558800"/>
+          </a:xfrm>
+        </p:spPr>
+        <p:txBody>
+          <a:bodyPr>
+            <a:normAutofit/>
+          </a:bodyPr>
+          <a:lstStyle/>
+          <a:p>
+            <a:r>
+              <a:rPr lang="de-DE" sz="2000"/>
+              <a:t>generate_pcf_from_top.py</a:t>
+            </a:r>
+            <a:endParaRPr lang="en-US" sz="2000"/>
+          </a:p>
+        </p:txBody>
+      </p:sp>
+      <p:sp>
+        <p:nvSpPr>
+          <p:cNvPr id="5" name="Textfeld 4">
+            <a:extLst>
+              <a:ext uri="{FF2B5EF4-FFF2-40B4-BE49-F238E27FC236}">
+                <a16:creationId xmlns:a16="http://schemas.microsoft.com/office/drawing/2014/main" id="{2A161088-452B-C7CD-56A0-EDFDC0150255}"/>
+              </a:ext>
+            </a:extLst>
+          </p:cNvPr>
+          <p:cNvSpPr txBox="1"/>
+          <p:nvPr/>
+        </p:nvSpPr>
+        <p:spPr>
+          <a:xfrm>
+            <a:off x="838200" y="1048435"/>
+            <a:ext cx="6096000" cy="4801314"/>
+          </a:xfrm>
+          <a:prstGeom prst="rect">
+            <a:avLst/>
+          </a:prstGeom>
+          <a:noFill/>
+        </p:spPr>
+        <p:txBody>
+          <a:bodyPr wrap="square">
+            <a:spAutoFit/>
+          </a:bodyPr>
+          <a:lstStyle/>
+          <a:p>
+            <a:r>
+              <a:rPr lang="en-US"/>
+              <a:t>readg96</a:t>
+            </a:r>
+          </a:p>
+          <a:p>
+            <a:r>
+              <a:rPr lang="en-US"/>
+              <a:t>    '''</a:t>
+            </a:r>
+          </a:p>
+          <a:p>
+            <a:r>
+              <a:rPr lang="en-US"/>
+              <a:t>    ------------------------------</a:t>
+            </a:r>
+          </a:p>
+          <a:p>
+            <a:r>
+              <a:rPr lang="en-US"/>
+              <a:t>    EFFECT: \\</a:t>
+            </a:r>
+          </a:p>
+          <a:p>
+            <a:r>
+              <a:rPr lang="en-US"/>
+              <a:t>    --------------- </a:t>
+            </a:r>
+          </a:p>
+          <a:p>
+            <a:r>
+              <a:rPr lang="en-US"/>
+              <a:t>    reads coordinates of all atoms from a g96 file</a:t>
+            </a:r>
+          </a:p>
+          <a:p>
+            <a:r>
+              <a:rPr lang="en-US"/>
+              <a:t>    ------------------------------</a:t>
+            </a:r>
+          </a:p>
+          <a:p>
+            <a:r>
+              <a:rPr lang="en-US"/>
+              <a:t>    INPUT: \\</a:t>
+            </a:r>
+          </a:p>
+          <a:p>
+            <a:r>
+              <a:rPr lang="en-US"/>
+              <a:t>    --------------- </a:t>
+            </a:r>
+          </a:p>
+          <a:p>
+            <a:r>
+              <a:rPr lang="en-US"/>
+              <a:t>    inp: string, name of g96 file</a:t>
+            </a:r>
+          </a:p>
+          <a:p>
+            <a:r>
+              <a:rPr lang="en-US"/>
+              <a:t>    ------------------------------</a:t>
+            </a:r>
+          </a:p>
+          <a:p>
+            <a:r>
+              <a:rPr lang="en-US"/>
+              <a:t>    RETURN: \\</a:t>
+            </a:r>
+          </a:p>
+          <a:p>
+            <a:r>
+              <a:rPr lang="en-US"/>
+              <a:t>    --------------- </a:t>
+            </a:r>
+          </a:p>
+          <a:p>
+            <a:r>
+              <a:rPr lang="en-US"/>
+              <a:t>    coords: list of coordinates</a:t>
+            </a:r>
+          </a:p>
+          <a:p>
+            <a:r>
+              <a:rPr lang="en-US"/>
+              <a:t>    ------------------------------</a:t>
+            </a:r>
+          </a:p>
+          <a:p>
+            <a:r>
+              <a:rPr lang="en-US"/>
+              <a:t>    '''</a:t>
+            </a:r>
+          </a:p>
+          <a:p>
+            <a:endParaRPr lang="en-US" sz="1800"/>
+          </a:p>
+        </p:txBody>
+      </p:sp>
+    </p:spTree>
+    <p:extLst>
+      <p:ext uri="{BB962C8B-B14F-4D97-AF65-F5344CB8AC3E}">
+        <p14:creationId xmlns:p14="http://schemas.microsoft.com/office/powerpoint/2010/main" val="61112730"/>
+      </p:ext>
+    </p:extLst>
+  </p:cSld>
+  <p:clrMapOvr>
+    <a:masterClrMapping/>
+  </p:clrMapOvr>
+</p:sld>
+</file>
+
+<file path=ppt/slides/slide62.xml><?xml version="1.0" encoding="utf-8"?>
+<p:sld xmlns:a="http://schemas.openxmlformats.org/drawingml/2006/main" xmlns:r="http://schemas.openxmlformats.org/officeDocument/2006/relationships" xmlns:p="http://schemas.openxmlformats.org/presentationml/2006/main">
+  <p:cSld>
+    <p:spTree>
+      <p:nvGrpSpPr>
+        <p:cNvPr id="1" name="">
+          <a:extLst>
+            <a:ext uri="{FF2B5EF4-FFF2-40B4-BE49-F238E27FC236}">
+              <a16:creationId xmlns:a16="http://schemas.microsoft.com/office/drawing/2014/main" id="{24D21813-B679-1CA5-9DD1-331D8D605C94}"/>
+            </a:ext>
+          </a:extLst>
+        </p:cNvPr>
+        <p:cNvGrpSpPr/>
+        <p:nvPr/>
+      </p:nvGrpSpPr>
+      <p:grpSpPr>
+        <a:xfrm>
+          <a:off x="0" y="0"/>
+          <a:ext cx="0" cy="0"/>
+          <a:chOff x="0" y="0"/>
+          <a:chExt cx="0" cy="0"/>
+        </a:xfrm>
+      </p:grpSpPr>
+      <p:sp>
+        <p:nvSpPr>
+          <p:cNvPr id="2" name="Titel 1">
+            <a:extLst>
+              <a:ext uri="{FF2B5EF4-FFF2-40B4-BE49-F238E27FC236}">
+                <a16:creationId xmlns:a16="http://schemas.microsoft.com/office/drawing/2014/main" id="{16D10C22-A932-A6BD-890B-E0DD7FF649C5}"/>
+              </a:ext>
+            </a:extLst>
+          </p:cNvPr>
+          <p:cNvSpPr>
+            <a:spLocks noGrp="1"/>
+          </p:cNvSpPr>
+          <p:nvPr>
+            <p:ph type="title"/>
+          </p:nvPr>
+        </p:nvSpPr>
+        <p:spPr>
+          <a:xfrm>
+            <a:off x="838200" y="365126"/>
+            <a:ext cx="10515600" cy="558800"/>
+          </a:xfrm>
+        </p:spPr>
+        <p:txBody>
+          <a:bodyPr>
+            <a:normAutofit/>
+          </a:bodyPr>
+          <a:lstStyle/>
+          <a:p>
+            <a:r>
+              <a:rPr lang="de-DE" sz="2000"/>
+              <a:t>generate_pcf_from_top.py</a:t>
+            </a:r>
+            <a:endParaRPr lang="en-US" sz="2000"/>
+          </a:p>
+        </p:txBody>
+      </p:sp>
+      <p:sp>
+        <p:nvSpPr>
+          <p:cNvPr id="5" name="Textfeld 4">
+            <a:extLst>
+              <a:ext uri="{FF2B5EF4-FFF2-40B4-BE49-F238E27FC236}">
+                <a16:creationId xmlns:a16="http://schemas.microsoft.com/office/drawing/2014/main" id="{361C819A-2B87-8F84-B4BD-077A851740E9}"/>
+              </a:ext>
+            </a:extLst>
+          </p:cNvPr>
+          <p:cNvSpPr txBox="1"/>
+          <p:nvPr/>
+        </p:nvSpPr>
+        <p:spPr>
+          <a:xfrm>
+            <a:off x="838200" y="1048435"/>
+            <a:ext cx="6096000" cy="4524315"/>
+          </a:xfrm>
+          <a:prstGeom prst="rect">
+            <a:avLst/>
+          </a:prstGeom>
+          <a:noFill/>
+        </p:spPr>
+        <p:txBody>
+          <a:bodyPr wrap="square">
+            <a:spAutoFit/>
+          </a:bodyPr>
+          <a:lstStyle/>
+          <a:p>
+            <a:r>
+              <a:rPr lang="en-US" sz="1800"/>
+              <a:t>read_numatoms</a:t>
+            </a:r>
+          </a:p>
+          <a:p>
+            <a:r>
+              <a:rPr lang="en-US" sz="1800"/>
+              <a:t>    '''</a:t>
+            </a:r>
+          </a:p>
+          <a:p>
+            <a:r>
+              <a:rPr lang="en-US" sz="1800"/>
+              <a:t>    ------------------------------</a:t>
+            </a:r>
+          </a:p>
+          <a:p>
+            <a:r>
+              <a:rPr lang="en-US" sz="1800"/>
+              <a:t>    EFFECT: \\</a:t>
+            </a:r>
+          </a:p>
+          <a:p>
+            <a:r>
+              <a:rPr lang="en-US" sz="1800"/>
+              <a:t>    --------------- </a:t>
+            </a:r>
+          </a:p>
+          <a:p>
+            <a:r>
+              <a:rPr lang="en-US" sz="1800"/>
+              <a:t>    reads and returns the number of atoms in the system</a:t>
+            </a:r>
+          </a:p>
+          <a:p>
+            <a:r>
+              <a:rPr lang="en-US" sz="1800"/>
+              <a:t>    ------------------------------</a:t>
+            </a:r>
+          </a:p>
+          <a:p>
+            <a:r>
+              <a:rPr lang="en-US" sz="1800"/>
+              <a:t>    INPUT: \\</a:t>
+            </a:r>
+          </a:p>
+          <a:p>
+            <a:r>
+              <a:rPr lang="en-US" sz="1800"/>
+              <a:t>    --------------- </a:t>
+            </a:r>
+          </a:p>
+          <a:p>
+            <a:r>
+              <a:rPr lang="en-US" sz="1800"/>
+              <a:t>    inp: string, name of structure file</a:t>
+            </a:r>
+          </a:p>
+          <a:p>
+            <a:r>
+              <a:rPr lang="en-US" sz="1800"/>
+              <a:t>    ------------------------------</a:t>
+            </a:r>
+          </a:p>
+          <a:p>
+            <a:r>
+              <a:rPr lang="en-US" sz="1800"/>
+              <a:t>    RETURN: \\</a:t>
+            </a:r>
+          </a:p>
+          <a:p>
+            <a:r>
+              <a:rPr lang="en-US" sz="1800"/>
+              <a:t>    --------------- </a:t>
+            </a:r>
+          </a:p>
+          <a:p>
+            <a:r>
+              <a:rPr lang="en-US"/>
+              <a:t>    int, number of atoms</a:t>
+            </a:r>
+            <a:endParaRPr lang="en-US" sz="1800"/>
+          </a:p>
+          <a:p>
+            <a:r>
+              <a:rPr lang="en-US" sz="1800"/>
+              <a:t>    ------------------------------</a:t>
+            </a:r>
+          </a:p>
+          <a:p>
+            <a:r>
+              <a:rPr lang="en-US" sz="1800"/>
+              <a:t>    '''</a:t>
+            </a:r>
+          </a:p>
+        </p:txBody>
+      </p:sp>
+    </p:spTree>
+    <p:extLst>
+      <p:ext uri="{BB962C8B-B14F-4D97-AF65-F5344CB8AC3E}">
+        <p14:creationId xmlns:p14="http://schemas.microsoft.com/office/powerpoint/2010/main" val="2399989862"/>
+      </p:ext>
+    </p:extLst>
+  </p:cSld>
+  <p:clrMapOvr>
+    <a:masterClrMapping/>
+  </p:clrMapOvr>
+</p:sld>
+</file>
+
+<file path=ppt/slides/slide63.xml><?xml version="1.0" encoding="utf-8"?>
+<p:sld xmlns:a="http://schemas.openxmlformats.org/drawingml/2006/main" xmlns:r="http://schemas.openxmlformats.org/officeDocument/2006/relationships" xmlns:p="http://schemas.openxmlformats.org/presentationml/2006/main">
+  <p:cSld>
+    <p:spTree>
+      <p:nvGrpSpPr>
+        <p:cNvPr id="1" name="">
+          <a:extLst>
+            <a:ext uri="{FF2B5EF4-FFF2-40B4-BE49-F238E27FC236}">
+              <a16:creationId xmlns:a16="http://schemas.microsoft.com/office/drawing/2014/main" id="{F7496203-DB3E-745D-87F8-C83B25F99705}"/>
+            </a:ext>
+          </a:extLst>
+        </p:cNvPr>
+        <p:cNvGrpSpPr/>
+        <p:nvPr/>
+      </p:nvGrpSpPr>
+      <p:grpSpPr>
+        <a:xfrm>
+          <a:off x="0" y="0"/>
+          <a:ext cx="0" cy="0"/>
+          <a:chOff x="0" y="0"/>
+          <a:chExt cx="0" cy="0"/>
+        </a:xfrm>
+      </p:grpSpPr>
+      <p:sp>
+        <p:nvSpPr>
+          <p:cNvPr id="2" name="Titel 1">
+            <a:extLst>
+              <a:ext uri="{FF2B5EF4-FFF2-40B4-BE49-F238E27FC236}">
+                <a16:creationId xmlns:a16="http://schemas.microsoft.com/office/drawing/2014/main" id="{A59AC7F6-73C7-41A4-8194-6440C3540D42}"/>
+              </a:ext>
+            </a:extLst>
+          </p:cNvPr>
+          <p:cNvSpPr>
+            <a:spLocks noGrp="1"/>
+          </p:cNvSpPr>
+          <p:nvPr>
+            <p:ph type="title"/>
+          </p:nvPr>
+        </p:nvSpPr>
+        <p:spPr>
+          <a:xfrm>
+            <a:off x="838200" y="365126"/>
+            <a:ext cx="10515600" cy="558800"/>
+          </a:xfrm>
+        </p:spPr>
+        <p:txBody>
+          <a:bodyPr>
+            <a:normAutofit/>
+          </a:bodyPr>
+          <a:lstStyle/>
+          <a:p>
+            <a:r>
+              <a:rPr lang="de-DE" sz="2000"/>
+              <a:t>generate_pcf_from_top.py</a:t>
+            </a:r>
+            <a:endParaRPr lang="en-US" sz="2000"/>
+          </a:p>
+        </p:txBody>
+      </p:sp>
+      <p:sp>
+        <p:nvSpPr>
+          <p:cNvPr id="5" name="Textfeld 4">
+            <a:extLst>
+              <a:ext uri="{FF2B5EF4-FFF2-40B4-BE49-F238E27FC236}">
+                <a16:creationId xmlns:a16="http://schemas.microsoft.com/office/drawing/2014/main" id="{C900E4AE-CC9C-8189-7900-8FED6E39C909}"/>
+              </a:ext>
+            </a:extLst>
+          </p:cNvPr>
+          <p:cNvSpPr txBox="1"/>
+          <p:nvPr/>
+        </p:nvSpPr>
+        <p:spPr>
+          <a:xfrm>
+            <a:off x="838200" y="1048435"/>
+            <a:ext cx="6096000" cy="4524315"/>
+          </a:xfrm>
+          <a:prstGeom prst="rect">
+            <a:avLst/>
+          </a:prstGeom>
+          <a:noFill/>
+        </p:spPr>
+        <p:txBody>
+          <a:bodyPr wrap="square">
+            <a:spAutoFit/>
+          </a:bodyPr>
+          <a:lstStyle/>
+          <a:p>
+            <a:r>
+              <a:rPr lang="en-US" b="0">
+                <a:solidFill>
+                  <a:srgbClr val="DCDCAA"/>
+                </a:solidFill>
+                <a:effectLst/>
+                <a:latin typeface="Consolas" panose="020B0609020204030204" pitchFamily="49" charset="0"/>
+              </a:rPr>
+              <a:t>readmols</a:t>
+            </a:r>
+            <a:endParaRPr lang="en-US" b="0">
+              <a:solidFill>
+                <a:srgbClr val="CCCCCC"/>
+              </a:solidFill>
+              <a:effectLst/>
+              <a:latin typeface="Consolas" panose="020B0609020204030204" pitchFamily="49" charset="0"/>
+            </a:endParaRPr>
+          </a:p>
+          <a:p>
+            <a:r>
+              <a:rPr lang="en-US" sz="1800"/>
+              <a:t>    '''</a:t>
+            </a:r>
+          </a:p>
+          <a:p>
+            <a:r>
+              <a:rPr lang="en-US" sz="1800"/>
+              <a:t>    ------------------------------</a:t>
+            </a:r>
+          </a:p>
+          <a:p>
+            <a:r>
+              <a:rPr lang="en-US" sz="1800"/>
+              <a:t>    EFFECT: \\</a:t>
+            </a:r>
+          </a:p>
+          <a:p>
+            <a:r>
+              <a:rPr lang="en-US" sz="1800"/>
+              <a:t>    --------------- </a:t>
+            </a:r>
+          </a:p>
+          <a:p>
+            <a:r>
+              <a:rPr lang="en-US" sz="1800"/>
+              <a:t>    reads list of molecules from the topology file</a:t>
+            </a:r>
+          </a:p>
+          <a:p>
+            <a:r>
+              <a:rPr lang="en-US" sz="1800"/>
+              <a:t>    ------------------------------</a:t>
+            </a:r>
+          </a:p>
+          <a:p>
+            <a:r>
+              <a:rPr lang="en-US" sz="1800"/>
+              <a:t>    INPUT: \\</a:t>
+            </a:r>
+          </a:p>
+          <a:p>
+            <a:r>
+              <a:rPr lang="en-US" sz="1800"/>
+              <a:t>    --------------- </a:t>
+            </a:r>
+          </a:p>
+          <a:p>
+            <a:r>
+              <a:rPr lang="en-US" sz="1800"/>
+              <a:t>    </a:t>
+            </a:r>
+            <a:r>
+              <a:rPr lang="en-US" b="0">
+                <a:solidFill>
+                  <a:srgbClr val="9CDCFE"/>
+                </a:solidFill>
+                <a:effectLst/>
+                <a:latin typeface="Consolas" panose="020B0609020204030204" pitchFamily="49" charset="0"/>
+              </a:rPr>
+              <a:t>top</a:t>
+            </a:r>
+            <a:r>
+              <a:rPr lang="en-US">
+                <a:solidFill>
+                  <a:srgbClr val="CCCCCC"/>
+                </a:solidFill>
+                <a:latin typeface="Consolas" panose="020B0609020204030204" pitchFamily="49" charset="0"/>
+              </a:rPr>
+              <a:t>: string, name of topology file</a:t>
+            </a:r>
+            <a:endParaRPr lang="en-US" sz="1800"/>
+          </a:p>
+          <a:p>
+            <a:r>
+              <a:rPr lang="en-US" sz="1800"/>
+              <a:t>    ------------------------------</a:t>
+            </a:r>
+          </a:p>
+          <a:p>
+            <a:r>
+              <a:rPr lang="en-US" sz="1800"/>
+              <a:t>    RETURN: \\</a:t>
+            </a:r>
+          </a:p>
+          <a:p>
+            <a:r>
+              <a:rPr lang="en-US" sz="1800"/>
+              <a:t>    --------------- </a:t>
+            </a:r>
+          </a:p>
+          <a:p>
+            <a:r>
+              <a:rPr lang="en-US"/>
+              <a:t>    mollist: list of molecules and their amount in the system</a:t>
+            </a:r>
+            <a:endParaRPr lang="en-US" sz="1800"/>
+          </a:p>
+          <a:p>
+            <a:r>
+              <a:rPr lang="en-US" sz="1800"/>
+              <a:t>    ------------------------------</a:t>
+            </a:r>
+          </a:p>
+          <a:p>
+            <a:r>
+              <a:rPr lang="en-US" sz="1800"/>
+              <a:t>    '''</a:t>
+            </a:r>
+          </a:p>
+        </p:txBody>
+      </p:sp>
+    </p:spTree>
+    <p:extLst>
+      <p:ext uri="{BB962C8B-B14F-4D97-AF65-F5344CB8AC3E}">
+        <p14:creationId xmlns:p14="http://schemas.microsoft.com/office/powerpoint/2010/main" val="1470790211"/>
+      </p:ext>
+    </p:extLst>
+  </p:cSld>
+  <p:clrMapOvr>
+    <a:masterClrMapping/>
+  </p:clrMapOvr>
+</p:sld>
+</file>
+
+<file path=ppt/slides/slide64.xml><?xml version="1.0" encoding="utf-8"?>
+<p:sld xmlns:a="http://schemas.openxmlformats.org/drawingml/2006/main" xmlns:r="http://schemas.openxmlformats.org/officeDocument/2006/relationships" xmlns:p="http://schemas.openxmlformats.org/presentationml/2006/main">
+  <p:cSld>
+    <p:spTree>
+      <p:nvGrpSpPr>
+        <p:cNvPr id="1" name="">
+          <a:extLst>
+            <a:ext uri="{FF2B5EF4-FFF2-40B4-BE49-F238E27FC236}">
+              <a16:creationId xmlns:a16="http://schemas.microsoft.com/office/drawing/2014/main" id="{80E2B9A4-F9AB-0D5E-1288-F419780998F3}"/>
+            </a:ext>
+          </a:extLst>
+        </p:cNvPr>
+        <p:cNvGrpSpPr/>
+        <p:nvPr/>
+      </p:nvGrpSpPr>
+      <p:grpSpPr>
+        <a:xfrm>
+          <a:off x="0" y="0"/>
+          <a:ext cx="0" cy="0"/>
+          <a:chOff x="0" y="0"/>
+          <a:chExt cx="0" cy="0"/>
+        </a:xfrm>
+      </p:grpSpPr>
+      <p:sp>
+        <p:nvSpPr>
+          <p:cNvPr id="2" name="Titel 1">
+            <a:extLst>
+              <a:ext uri="{FF2B5EF4-FFF2-40B4-BE49-F238E27FC236}">
+                <a16:creationId xmlns:a16="http://schemas.microsoft.com/office/drawing/2014/main" id="{D81A6E06-C4D9-412F-F43D-E74DC0769AF2}"/>
+              </a:ext>
+            </a:extLst>
+          </p:cNvPr>
+          <p:cNvSpPr>
+            <a:spLocks noGrp="1"/>
+          </p:cNvSpPr>
+          <p:nvPr>
+            <p:ph type="title"/>
+          </p:nvPr>
+        </p:nvSpPr>
+        <p:spPr>
+          <a:xfrm>
+            <a:off x="838200" y="365126"/>
+            <a:ext cx="10515600" cy="558800"/>
+          </a:xfrm>
+        </p:spPr>
+        <p:txBody>
+          <a:bodyPr>
+            <a:normAutofit/>
+          </a:bodyPr>
+          <a:lstStyle/>
+          <a:p>
+            <a:r>
+              <a:rPr lang="de-DE" sz="2000"/>
+              <a:t>generate_pcf_from_top.py</a:t>
+            </a:r>
+            <a:endParaRPr lang="en-US" sz="2000"/>
+          </a:p>
+        </p:txBody>
+      </p:sp>
+      <p:sp>
+        <p:nvSpPr>
+          <p:cNvPr id="5" name="Textfeld 4">
+            <a:extLst>
+              <a:ext uri="{FF2B5EF4-FFF2-40B4-BE49-F238E27FC236}">
+                <a16:creationId xmlns:a16="http://schemas.microsoft.com/office/drawing/2014/main" id="{94D14523-CA9F-7C3C-C599-20293CF05B3E}"/>
+              </a:ext>
+            </a:extLst>
+          </p:cNvPr>
+          <p:cNvSpPr txBox="1"/>
+          <p:nvPr/>
+        </p:nvSpPr>
+        <p:spPr>
+          <a:xfrm>
+            <a:off x="838200" y="1048435"/>
+            <a:ext cx="6096000" cy="4524315"/>
+          </a:xfrm>
+          <a:prstGeom prst="rect">
+            <a:avLst/>
+          </a:prstGeom>
+          <a:noFill/>
+        </p:spPr>
+        <p:txBody>
+          <a:bodyPr wrap="square">
+            <a:spAutoFit/>
+          </a:bodyPr>
+          <a:lstStyle/>
+          <a:p>
+            <a:r>
+              <a:rPr lang="en-US" sz="1800"/>
+              <a:t>dupli</a:t>
+            </a:r>
+          </a:p>
+          <a:p>
+            <a:r>
+              <a:rPr lang="en-US" sz="1800"/>
+              <a:t>    '''</a:t>
+            </a:r>
+          </a:p>
+          <a:p>
+            <a:r>
+              <a:rPr lang="en-US" sz="1800"/>
+              <a:t>    ------------------------------</a:t>
+            </a:r>
+          </a:p>
+          <a:p>
+            <a:r>
+              <a:rPr lang="en-US" sz="1800"/>
+              <a:t>    EFFECT: \\</a:t>
+            </a:r>
+          </a:p>
+          <a:p>
+            <a:r>
+              <a:rPr lang="en-US" sz="1800"/>
+              <a:t>    --------------- </a:t>
+            </a:r>
+          </a:p>
+          <a:p>
+            <a:r>
+              <a:rPr lang="en-US" sz="1800"/>
+              <a:t>    XX</a:t>
+            </a:r>
+          </a:p>
+          <a:p>
+            <a:r>
+              <a:rPr lang="en-US" sz="1800"/>
+              <a:t>    ------------------------------</a:t>
+            </a:r>
+          </a:p>
+          <a:p>
+            <a:r>
+              <a:rPr lang="en-US" sz="1800"/>
+              <a:t>    INPUT: \\</a:t>
+            </a:r>
+          </a:p>
+          <a:p>
+            <a:r>
+              <a:rPr lang="en-US" sz="1800"/>
+              <a:t>    --------------- </a:t>
+            </a:r>
+          </a:p>
+          <a:p>
+            <a:r>
+              <a:rPr lang="en-US" sz="1800"/>
+              <a:t>    </a:t>
+            </a:r>
+          </a:p>
+          <a:p>
+            <a:r>
+              <a:rPr lang="en-US" sz="1800"/>
+              <a:t>    ------------------------------</a:t>
+            </a:r>
+          </a:p>
+          <a:p>
+            <a:r>
+              <a:rPr lang="en-US" sz="1800"/>
+              <a:t>    RETURN: \\</a:t>
+            </a:r>
+          </a:p>
+          <a:p>
+            <a:r>
+              <a:rPr lang="en-US" sz="1800"/>
+              <a:t>    --------------- </a:t>
+            </a:r>
+          </a:p>
+          <a:p>
+            <a:r>
+              <a:rPr lang="en-US"/>
+              <a:t>    </a:t>
+            </a:r>
+            <a:endParaRPr lang="en-US" sz="1800"/>
+          </a:p>
+          <a:p>
+            <a:r>
+              <a:rPr lang="en-US" sz="1800"/>
+              <a:t>    ------------------------------</a:t>
+            </a:r>
+          </a:p>
+          <a:p>
+            <a:r>
+              <a:rPr lang="en-US" sz="1800"/>
+              <a:t>    '''</a:t>
+            </a:r>
+          </a:p>
+        </p:txBody>
+      </p:sp>
+    </p:spTree>
+    <p:extLst>
+      <p:ext uri="{BB962C8B-B14F-4D97-AF65-F5344CB8AC3E}">
+        <p14:creationId xmlns:p14="http://schemas.microsoft.com/office/powerpoint/2010/main" val="4192851386"/>
+      </p:ext>
+    </p:extLst>
+  </p:cSld>
+  <p:clrMapOvr>
+    <a:masterClrMapping/>
+  </p:clrMapOvr>
+</p:sld>
+</file>
+
+<file path=ppt/slides/slide65.xml><?xml version="1.0" encoding="utf-8"?>
+<p:sld xmlns:a="http://schemas.openxmlformats.org/drawingml/2006/main" xmlns:r="http://schemas.openxmlformats.org/officeDocument/2006/relationships" xmlns:p="http://schemas.openxmlformats.org/presentationml/2006/main">
+  <p:cSld>
+    <p:spTree>
+      <p:nvGrpSpPr>
+        <p:cNvPr id="1" name="">
+          <a:extLst>
+            <a:ext uri="{FF2B5EF4-FFF2-40B4-BE49-F238E27FC236}">
+              <a16:creationId xmlns:a16="http://schemas.microsoft.com/office/drawing/2014/main" id="{921166F5-C120-A59E-C91B-25A1F3B2CC13}"/>
+            </a:ext>
+          </a:extLst>
+        </p:cNvPr>
+        <p:cNvGrpSpPr/>
+        <p:nvPr/>
+      </p:nvGrpSpPr>
+      <p:grpSpPr>
+        <a:xfrm>
+          <a:off x="0" y="0"/>
+          <a:ext cx="0" cy="0"/>
+          <a:chOff x="0" y="0"/>
+          <a:chExt cx="0" cy="0"/>
+        </a:xfrm>
+      </p:grpSpPr>
+      <p:sp>
+        <p:nvSpPr>
+          <p:cNvPr id="2" name="Titel 1">
+            <a:extLst>
+              <a:ext uri="{FF2B5EF4-FFF2-40B4-BE49-F238E27FC236}">
+                <a16:creationId xmlns:a16="http://schemas.microsoft.com/office/drawing/2014/main" id="{BF600F95-94ED-267D-22EB-C2EE09434C0F}"/>
+              </a:ext>
+            </a:extLst>
+          </p:cNvPr>
+          <p:cNvSpPr>
+            <a:spLocks noGrp="1"/>
+          </p:cNvSpPr>
+          <p:nvPr>
+            <p:ph type="title"/>
+          </p:nvPr>
+        </p:nvSpPr>
+        <p:spPr>
+          <a:xfrm>
+            <a:off x="838200" y="365126"/>
+            <a:ext cx="10515600" cy="558800"/>
+          </a:xfrm>
+        </p:spPr>
+        <p:txBody>
+          <a:bodyPr>
+            <a:normAutofit/>
+          </a:bodyPr>
+          <a:lstStyle/>
+          <a:p>
+            <a:r>
+              <a:rPr lang="en-US" sz="2000"/>
+              <a:t>prepare_pcf_for_shift.py</a:t>
+            </a:r>
+          </a:p>
+        </p:txBody>
+      </p:sp>
+      <p:sp>
+        <p:nvSpPr>
+          <p:cNvPr id="5" name="Textfeld 4">
+            <a:extLst>
+              <a:ext uri="{FF2B5EF4-FFF2-40B4-BE49-F238E27FC236}">
+                <a16:creationId xmlns:a16="http://schemas.microsoft.com/office/drawing/2014/main" id="{5A3A448D-D1B3-310E-E9FF-4F2C6F71A80A}"/>
+              </a:ext>
+            </a:extLst>
+          </p:cNvPr>
+          <p:cNvSpPr txBox="1"/>
+          <p:nvPr/>
+        </p:nvSpPr>
+        <p:spPr>
+          <a:xfrm>
+            <a:off x="838200" y="1048435"/>
+            <a:ext cx="6096000" cy="4524315"/>
+          </a:xfrm>
+          <a:prstGeom prst="rect">
+            <a:avLst/>
+          </a:prstGeom>
+          <a:noFill/>
+        </p:spPr>
+        <p:txBody>
+          <a:bodyPr wrap="square">
+            <a:spAutoFit/>
+          </a:bodyPr>
+          <a:lstStyle/>
+          <a:p>
+            <a:r>
+              <a:rPr lang="en-US"/>
+              <a:t>read_qmatom_list</a:t>
+            </a:r>
+          </a:p>
+          <a:p>
+            <a:r>
+              <a:rPr lang="en-US"/>
+              <a:t>    '''</a:t>
+            </a:r>
+          </a:p>
+          <a:p>
+            <a:r>
+              <a:rPr lang="en-US" sz="1800"/>
+              <a:t>    ------------------------------</a:t>
+            </a:r>
+          </a:p>
+          <a:p>
+            <a:r>
+              <a:rPr lang="en-US" sz="1800"/>
+              <a:t>    EFFECT: \\</a:t>
+            </a:r>
+          </a:p>
+          <a:p>
+            <a:r>
+              <a:rPr lang="en-US" sz="1800"/>
+              <a:t>    --------------- </a:t>
+            </a:r>
+          </a:p>
+          <a:p>
+            <a:r>
+              <a:rPr lang="en-US" sz="1800"/>
+              <a:t>    </a:t>
+            </a:r>
+            <a:r>
+              <a:rPr lang="en-US"/>
+              <a:t>reads and sorts qm atom indices</a:t>
+            </a:r>
+            <a:endParaRPr lang="en-US" sz="1800"/>
+          </a:p>
+          <a:p>
+            <a:r>
+              <a:rPr lang="en-US" sz="1800"/>
+              <a:t>    ------------------------------</a:t>
+            </a:r>
+          </a:p>
+          <a:p>
+            <a:r>
+              <a:rPr lang="en-US" sz="1800"/>
+              <a:t>    INPUT: \\</a:t>
+            </a:r>
+          </a:p>
+          <a:p>
+            <a:r>
+              <a:rPr lang="en-US" sz="1800"/>
+              <a:t>    --------------- </a:t>
+            </a:r>
+          </a:p>
+          <a:p>
+            <a:r>
+              <a:rPr lang="en-US" sz="1800"/>
+              <a:t>    inp: string, name of qm atoms index file</a:t>
+            </a:r>
+          </a:p>
+          <a:p>
+            <a:r>
+              <a:rPr lang="en-US" sz="1800"/>
+              <a:t>    ------------------------------</a:t>
+            </a:r>
+          </a:p>
+          <a:p>
+            <a:r>
+              <a:rPr lang="en-US" sz="1800"/>
+              <a:t>    </a:t>
+            </a:r>
+            <a:r>
+              <a:rPr lang="en-US"/>
+              <a:t>RETURN: \\</a:t>
+            </a:r>
+          </a:p>
+          <a:p>
+            <a:r>
+              <a:rPr lang="en-US"/>
+              <a:t>    --------------- </a:t>
+            </a:r>
+          </a:p>
+          <a:p>
+            <a:r>
+              <a:rPr lang="en-US"/>
+              <a:t>    sortedlist: list of sorted qm atom indices</a:t>
+            </a:r>
+          </a:p>
+          <a:p>
+            <a:r>
+              <a:rPr lang="en-US"/>
+              <a:t>    ------------------------------</a:t>
+            </a:r>
+          </a:p>
+          <a:p>
+            <a:r>
+              <a:rPr lang="en-US"/>
+              <a:t>    '''</a:t>
+            </a:r>
+          </a:p>
+        </p:txBody>
+      </p:sp>
+    </p:spTree>
+    <p:extLst>
+      <p:ext uri="{BB962C8B-B14F-4D97-AF65-F5344CB8AC3E}">
+        <p14:creationId xmlns:p14="http://schemas.microsoft.com/office/powerpoint/2010/main" val="3388953281"/>
+      </p:ext>
+    </p:extLst>
+  </p:cSld>
+  <p:clrMapOvr>
+    <a:masterClrMapping/>
+  </p:clrMapOvr>
+</p:sld>
+</file>
+
+<file path=ppt/slides/slide66.xml><?xml version="1.0" encoding="utf-8"?>
+<p:sld xmlns:a="http://schemas.openxmlformats.org/drawingml/2006/main" xmlns:r="http://schemas.openxmlformats.org/officeDocument/2006/relationships" xmlns:p="http://schemas.openxmlformats.org/presentationml/2006/main">
+  <p:cSld>
+    <p:spTree>
+      <p:nvGrpSpPr>
+        <p:cNvPr id="1" name="">
+          <a:extLst>
+            <a:ext uri="{FF2B5EF4-FFF2-40B4-BE49-F238E27FC236}">
+              <a16:creationId xmlns:a16="http://schemas.microsoft.com/office/drawing/2014/main" id="{55860233-BBE7-FE0D-B5B7-25688D928EAA}"/>
+            </a:ext>
+          </a:extLst>
+        </p:cNvPr>
+        <p:cNvGrpSpPr/>
+        <p:nvPr/>
+      </p:nvGrpSpPr>
+      <p:grpSpPr>
+        <a:xfrm>
+          <a:off x="0" y="0"/>
+          <a:ext cx="0" cy="0"/>
+          <a:chOff x="0" y="0"/>
+          <a:chExt cx="0" cy="0"/>
+        </a:xfrm>
+      </p:grpSpPr>
+      <p:sp>
+        <p:nvSpPr>
+          <p:cNvPr id="2" name="Titel 1">
+            <a:extLst>
+              <a:ext uri="{FF2B5EF4-FFF2-40B4-BE49-F238E27FC236}">
+                <a16:creationId xmlns:a16="http://schemas.microsoft.com/office/drawing/2014/main" id="{C6BF6D0F-C4A5-CFC3-F307-3183064B0F11}"/>
+              </a:ext>
+            </a:extLst>
+          </p:cNvPr>
+          <p:cNvSpPr>
+            <a:spLocks noGrp="1"/>
+          </p:cNvSpPr>
+          <p:nvPr>
+            <p:ph type="title"/>
+          </p:nvPr>
+        </p:nvSpPr>
+        <p:spPr>
+          <a:xfrm>
+            <a:off x="838200" y="365126"/>
+            <a:ext cx="10515600" cy="558800"/>
+          </a:xfrm>
+        </p:spPr>
+        <p:txBody>
+          <a:bodyPr>
+            <a:normAutofit/>
+          </a:bodyPr>
+          <a:lstStyle/>
+          <a:p>
+            <a:r>
+              <a:rPr lang="en-US" sz="2000"/>
+              <a:t>prepare_pcf_for_shift.py</a:t>
+            </a:r>
+          </a:p>
+        </p:txBody>
+      </p:sp>
+      <p:sp>
+        <p:nvSpPr>
+          <p:cNvPr id="5" name="Textfeld 4">
+            <a:extLst>
+              <a:ext uri="{FF2B5EF4-FFF2-40B4-BE49-F238E27FC236}">
+                <a16:creationId xmlns:a16="http://schemas.microsoft.com/office/drawing/2014/main" id="{EB52E366-6E8B-A88B-C7D4-21BCCE3E88EA}"/>
+              </a:ext>
+            </a:extLst>
+          </p:cNvPr>
+          <p:cNvSpPr txBox="1"/>
+          <p:nvPr/>
+        </p:nvSpPr>
+        <p:spPr>
+          <a:xfrm>
+            <a:off x="838200" y="1048435"/>
+            <a:ext cx="6096000" cy="5078313"/>
+          </a:xfrm>
+          <a:prstGeom prst="rect">
+            <a:avLst/>
+          </a:prstGeom>
+          <a:noFill/>
+        </p:spPr>
+        <p:txBody>
+          <a:bodyPr wrap="square">
+            <a:spAutoFit/>
+          </a:bodyPr>
+          <a:lstStyle/>
+          <a:p>
+            <a:r>
+              <a:rPr lang="en-US" b="0">
+                <a:solidFill>
+                  <a:srgbClr val="DCDCAA"/>
+                </a:solidFill>
+                <a:effectLst/>
+                <a:latin typeface="Consolas" panose="020B0609020204030204" pitchFamily="49" charset="0"/>
+              </a:rPr>
+              <a:t>identify_m2</a:t>
+            </a:r>
+            <a:endParaRPr lang="en-US" sz="1800"/>
+          </a:p>
+          <a:p>
+            <a:r>
+              <a:rPr lang="en-US" sz="1800"/>
+              <a:t>    '''</a:t>
+            </a:r>
+          </a:p>
+          <a:p>
+            <a:r>
+              <a:rPr lang="en-US" sz="1800"/>
+              <a:t>    ------------------------------</a:t>
+            </a:r>
+          </a:p>
+          <a:p>
+            <a:r>
+              <a:rPr lang="en-US" sz="1800"/>
+              <a:t>    EFFECT: \\</a:t>
+            </a:r>
+          </a:p>
+          <a:p>
+            <a:r>
+              <a:rPr lang="en-US" sz="1800"/>
+              <a:t>    --------------- </a:t>
+            </a:r>
+          </a:p>
+          <a:p>
+            <a:r>
+              <a:rPr lang="en-US" sz="1800"/>
+              <a:t>    </a:t>
+            </a:r>
+            <a:r>
+              <a:rPr lang="en-US"/>
+              <a:t>reads out all m2 atoms</a:t>
+            </a:r>
+            <a:endParaRPr lang="en-US" sz="1800"/>
+          </a:p>
+          <a:p>
+            <a:r>
+              <a:rPr lang="en-US" sz="1800"/>
+              <a:t>    ------------------------------</a:t>
+            </a:r>
+          </a:p>
+          <a:p>
+            <a:r>
+              <a:rPr lang="en-US" sz="1800"/>
+              <a:t>    INPUT: \\</a:t>
+            </a:r>
+          </a:p>
+          <a:p>
+            <a:r>
+              <a:rPr lang="en-US" sz="1800"/>
+              <a:t>    --------------- </a:t>
+            </a:r>
+          </a:p>
+          <a:p>
+            <a:r>
+              <a:rPr lang="en-US" sz="1800"/>
+              <a:t>    </a:t>
+            </a:r>
+            <a:r>
+              <a:rPr lang="en-US" b="0">
+                <a:solidFill>
+                  <a:srgbClr val="9CDCFE"/>
+                </a:solidFill>
+                <a:effectLst/>
+                <a:latin typeface="Consolas" panose="020B0609020204030204" pitchFamily="49" charset="0"/>
+              </a:rPr>
+              <a:t>qmlist: list of qm atom indices</a:t>
+            </a:r>
+          </a:p>
+          <a:p>
+            <a:r>
+              <a:rPr lang="en-US" b="0">
+                <a:solidFill>
+                  <a:srgbClr val="9CDCFE"/>
+                </a:solidFill>
+                <a:effectLst/>
+                <a:latin typeface="Consolas" panose="020B0609020204030204" pitchFamily="49" charset="0"/>
+              </a:rPr>
+              <a:t>m1</a:t>
+            </a:r>
+            <a:r>
+              <a:rPr lang="en-US">
+                <a:solidFill>
+                  <a:srgbClr val="9CDCFE"/>
+                </a:solidFill>
+                <a:latin typeface="Consolas" panose="020B0609020204030204" pitchFamily="49" charset="0"/>
+              </a:rPr>
+              <a:t>list: </a:t>
+            </a:r>
+            <a:r>
+              <a:rPr lang="en-US" b="0">
+                <a:solidFill>
+                  <a:srgbClr val="9CDCFE"/>
+                </a:solidFill>
+                <a:effectLst/>
+                <a:latin typeface="Consolas" panose="020B0609020204030204" pitchFamily="49" charset="0"/>
+              </a:rPr>
+              <a:t>list of m1 atom indices</a:t>
+            </a:r>
+            <a:endParaRPr lang="en-US" b="0">
+              <a:solidFill>
+                <a:srgbClr val="CCCCCC"/>
+              </a:solidFill>
+              <a:effectLst/>
+              <a:latin typeface="Consolas" panose="020B0609020204030204" pitchFamily="49" charset="0"/>
+            </a:endParaRPr>
+          </a:p>
+          <a:p>
+            <a:r>
+              <a:rPr lang="en-US" sz="1800"/>
+              <a:t>    </a:t>
+            </a:r>
+            <a:r>
+              <a:rPr lang="en-US" b="0">
+                <a:solidFill>
+                  <a:srgbClr val="9CDCFE"/>
+                </a:solidFill>
+                <a:effectLst/>
+                <a:latin typeface="Consolas" panose="020B0609020204030204" pitchFamily="49" charset="0"/>
+              </a:rPr>
+              <a:t>connlist: list of atom connection</a:t>
+            </a:r>
+            <a:endParaRPr lang="en-US" sz="1800"/>
+          </a:p>
+          <a:p>
+            <a:r>
+              <a:rPr lang="en-US" sz="1800"/>
+              <a:t>    ------------------------------</a:t>
+            </a:r>
+          </a:p>
+          <a:p>
+            <a:r>
+              <a:rPr lang="en-US" sz="1800"/>
+              <a:t>    RETURN: \\</a:t>
+            </a:r>
+          </a:p>
+          <a:p>
+            <a:r>
+              <a:rPr lang="en-US" sz="1800"/>
+              <a:t>    --------------- </a:t>
+            </a:r>
+          </a:p>
+          <a:p>
+            <a:r>
+              <a:rPr lang="en-US" b="0">
+                <a:solidFill>
+                  <a:srgbClr val="C586C0"/>
+                </a:solidFill>
+                <a:effectLst/>
+                <a:latin typeface="Consolas" panose="020B0609020204030204" pitchFamily="49" charset="0"/>
+              </a:rPr>
+              <a:t>  </a:t>
+            </a:r>
+            <a:r>
+              <a:rPr lang="en-US" b="0">
+                <a:solidFill>
+                  <a:srgbClr val="9CDCFE"/>
+                </a:solidFill>
+                <a:effectLst/>
+                <a:latin typeface="Consolas" panose="020B0609020204030204" pitchFamily="49" charset="0"/>
+              </a:rPr>
+              <a:t>m2list: list of m2 atom indices</a:t>
+            </a:r>
+            <a:endParaRPr lang="en-US" sz="1800"/>
+          </a:p>
+          <a:p>
+            <a:r>
+              <a:rPr lang="en-US" sz="1800"/>
+              <a:t>    ------------------------------</a:t>
+            </a:r>
+          </a:p>
+          <a:p>
+            <a:r>
+              <a:rPr lang="en-US" sz="1800"/>
+              <a:t>    '''</a:t>
+            </a:r>
+          </a:p>
+        </p:txBody>
+      </p:sp>
+    </p:spTree>
+    <p:extLst>
+      <p:ext uri="{BB962C8B-B14F-4D97-AF65-F5344CB8AC3E}">
+        <p14:creationId xmlns:p14="http://schemas.microsoft.com/office/powerpoint/2010/main" val="715513742"/>
+      </p:ext>
+    </p:extLst>
+  </p:cSld>
+  <p:clrMapOvr>
+    <a:masterClrMapping/>
+  </p:clrMapOvr>
+</p:sld>
+</file>
+
+<file path=ppt/slides/slide67.xml><?xml version="1.0" encoding="utf-8"?>
+<p:sld xmlns:a="http://schemas.openxmlformats.org/drawingml/2006/main" xmlns:r="http://schemas.openxmlformats.org/officeDocument/2006/relationships" xmlns:p="http://schemas.openxmlformats.org/presentationml/2006/main">
+  <p:cSld>
+    <p:spTree>
+      <p:nvGrpSpPr>
+        <p:cNvPr id="1" name="">
+          <a:extLst>
+            <a:ext uri="{FF2B5EF4-FFF2-40B4-BE49-F238E27FC236}">
+              <a16:creationId xmlns:a16="http://schemas.microsoft.com/office/drawing/2014/main" id="{B2F1BCF5-2FC9-902A-2913-983A59545F8B}"/>
+            </a:ext>
+          </a:extLst>
+        </p:cNvPr>
+        <p:cNvGrpSpPr/>
+        <p:nvPr/>
+      </p:nvGrpSpPr>
+      <p:grpSpPr>
+        <a:xfrm>
+          <a:off x="0" y="0"/>
+          <a:ext cx="0" cy="0"/>
+          <a:chOff x="0" y="0"/>
+          <a:chExt cx="0" cy="0"/>
+        </a:xfrm>
+      </p:grpSpPr>
+      <p:sp>
+        <p:nvSpPr>
+          <p:cNvPr id="2" name="Titel 1">
+            <a:extLst>
+              <a:ext uri="{FF2B5EF4-FFF2-40B4-BE49-F238E27FC236}">
+                <a16:creationId xmlns:a16="http://schemas.microsoft.com/office/drawing/2014/main" id="{47BCA218-8BE8-18CB-71A0-667017631FAA}"/>
+              </a:ext>
+            </a:extLst>
+          </p:cNvPr>
+          <p:cNvSpPr>
+            <a:spLocks noGrp="1"/>
+          </p:cNvSpPr>
+          <p:nvPr>
+            <p:ph type="title"/>
+          </p:nvPr>
+        </p:nvSpPr>
+        <p:spPr>
+          <a:xfrm>
+            <a:off x="838200" y="365126"/>
+            <a:ext cx="10515600" cy="558800"/>
+          </a:xfrm>
+        </p:spPr>
+        <p:txBody>
+          <a:bodyPr>
+            <a:normAutofit/>
+          </a:bodyPr>
+          <a:lstStyle/>
+          <a:p>
+            <a:r>
+              <a:rPr lang="en-US" sz="2000"/>
+              <a:t>prepare_pcf_for_shift.py</a:t>
+            </a:r>
+          </a:p>
+        </p:txBody>
+      </p:sp>
+      <p:sp>
+        <p:nvSpPr>
+          <p:cNvPr id="5" name="Textfeld 4">
+            <a:extLst>
+              <a:ext uri="{FF2B5EF4-FFF2-40B4-BE49-F238E27FC236}">
+                <a16:creationId xmlns:a16="http://schemas.microsoft.com/office/drawing/2014/main" id="{9AF7E838-8093-F7D6-F2E1-9E3930B6D5A5}"/>
+              </a:ext>
+            </a:extLst>
+          </p:cNvPr>
+          <p:cNvSpPr txBox="1"/>
+          <p:nvPr/>
+        </p:nvSpPr>
+        <p:spPr>
+          <a:xfrm>
+            <a:off x="838200" y="1048435"/>
+            <a:ext cx="6096000" cy="4801314"/>
+          </a:xfrm>
+          <a:prstGeom prst="rect">
+            <a:avLst/>
+          </a:prstGeom>
+          <a:noFill/>
+        </p:spPr>
+        <p:txBody>
+          <a:bodyPr wrap="square">
+            <a:spAutoFit/>
+          </a:bodyPr>
+          <a:lstStyle/>
+          <a:p>
+            <a:r>
+              <a:rPr lang="en-US" b="0">
+                <a:solidFill>
+                  <a:srgbClr val="DCDCAA"/>
+                </a:solidFill>
+                <a:effectLst/>
+                <a:latin typeface="Consolas" panose="020B0609020204030204" pitchFamily="49" charset="0"/>
+              </a:rPr>
+              <a:t>identify_m1</a:t>
+            </a:r>
+            <a:endParaRPr lang="en-US" sz="1800"/>
+          </a:p>
+          <a:p>
+            <a:r>
+              <a:rPr lang="en-US" sz="1800"/>
+              <a:t>    '''</a:t>
+            </a:r>
+          </a:p>
+          <a:p>
+            <a:r>
+              <a:rPr lang="en-US" sz="1800"/>
+              <a:t>    ------------------------------</a:t>
+            </a:r>
+          </a:p>
+          <a:p>
+            <a:r>
+              <a:rPr lang="en-US" sz="1800"/>
+              <a:t>    EFFECT: \\</a:t>
+            </a:r>
+          </a:p>
+          <a:p>
+            <a:r>
+              <a:rPr lang="en-US" sz="1800"/>
+              <a:t>    --------------- </a:t>
+            </a:r>
+          </a:p>
+          <a:p>
+            <a:r>
+              <a:rPr lang="en-US" sz="1800"/>
+              <a:t>    </a:t>
+            </a:r>
+            <a:r>
+              <a:rPr lang="en-US"/>
+              <a:t>reads out all m1 atoms</a:t>
+            </a:r>
+            <a:endParaRPr lang="en-US" sz="1800"/>
+          </a:p>
+          <a:p>
+            <a:r>
+              <a:rPr lang="en-US" sz="1800"/>
+              <a:t>    ------------------------------</a:t>
+            </a:r>
+          </a:p>
+          <a:p>
+            <a:r>
+              <a:rPr lang="en-US" sz="1800"/>
+              <a:t>    INPUT: \\</a:t>
+            </a:r>
+          </a:p>
+          <a:p>
+            <a:r>
+              <a:rPr lang="en-US" sz="1800"/>
+              <a:t>    --------------- </a:t>
+            </a:r>
+          </a:p>
+          <a:p>
+            <a:r>
+              <a:rPr lang="en-US" sz="1800"/>
+              <a:t>    </a:t>
+            </a:r>
+            <a:r>
+              <a:rPr lang="en-US" b="0">
+                <a:solidFill>
+                  <a:srgbClr val="9CDCFE"/>
+                </a:solidFill>
+                <a:effectLst/>
+                <a:latin typeface="Consolas" panose="020B0609020204030204" pitchFamily="49" charset="0"/>
+              </a:rPr>
+              <a:t>qmlist: list of qm atom indices</a:t>
+            </a:r>
+            <a:endParaRPr lang="en-US" b="0">
+              <a:solidFill>
+                <a:srgbClr val="CCCCCC"/>
+              </a:solidFill>
+              <a:effectLst/>
+              <a:latin typeface="Consolas" panose="020B0609020204030204" pitchFamily="49" charset="0"/>
+            </a:endParaRPr>
+          </a:p>
+          <a:p>
+            <a:r>
+              <a:rPr lang="en-US" sz="1800"/>
+              <a:t>    </a:t>
+            </a:r>
+            <a:r>
+              <a:rPr lang="en-US" b="0">
+                <a:solidFill>
+                  <a:srgbClr val="9CDCFE"/>
+                </a:solidFill>
+                <a:effectLst/>
+                <a:latin typeface="Consolas" panose="020B0609020204030204" pitchFamily="49" charset="0"/>
+              </a:rPr>
+              <a:t>connlist: list of atom connection</a:t>
+            </a:r>
+            <a:endParaRPr lang="en-US" sz="1800"/>
+          </a:p>
+          <a:p>
+            <a:r>
+              <a:rPr lang="en-US" sz="1800"/>
+              <a:t>    ------------------------------</a:t>
+            </a:r>
+          </a:p>
+          <a:p>
+            <a:r>
+              <a:rPr lang="en-US" sz="1800"/>
+              <a:t>    RETURN: \\</a:t>
+            </a:r>
+          </a:p>
+          <a:p>
+            <a:r>
+              <a:rPr lang="en-US" sz="1800"/>
+              <a:t>    --------------- </a:t>
+            </a:r>
+          </a:p>
+          <a:p>
+            <a:r>
+              <a:rPr lang="en-US" b="0">
+                <a:solidFill>
+                  <a:srgbClr val="C586C0"/>
+                </a:solidFill>
+                <a:effectLst/>
+                <a:latin typeface="Consolas" panose="020B0609020204030204" pitchFamily="49" charset="0"/>
+              </a:rPr>
+              <a:t>  </a:t>
+            </a:r>
+            <a:r>
+              <a:rPr lang="en-US" b="0">
+                <a:solidFill>
+                  <a:srgbClr val="9CDCFE"/>
+                </a:solidFill>
+                <a:effectLst/>
+                <a:latin typeface="Consolas" panose="020B0609020204030204" pitchFamily="49" charset="0"/>
+              </a:rPr>
+              <a:t>m1list: list of m1 atom indices</a:t>
+            </a:r>
+            <a:endParaRPr lang="en-US" sz="1800"/>
+          </a:p>
+          <a:p>
+            <a:r>
+              <a:rPr lang="en-US" sz="1800"/>
+              <a:t>    ------------------------------</a:t>
+            </a:r>
+          </a:p>
+          <a:p>
+            <a:r>
+              <a:rPr lang="en-US" sz="1800"/>
+              <a:t>    '''</a:t>
+            </a:r>
+          </a:p>
+        </p:txBody>
+      </p:sp>
+    </p:spTree>
+    <p:extLst>
+      <p:ext uri="{BB962C8B-B14F-4D97-AF65-F5344CB8AC3E}">
+        <p14:creationId xmlns:p14="http://schemas.microsoft.com/office/powerpoint/2010/main" val="1388236906"/>
+      </p:ext>
+    </p:extLst>
+  </p:cSld>
+  <p:clrMapOvr>
+    <a:masterClrMapping/>
+  </p:clrMapOvr>
+</p:sld>
+</file>
+
+<file path=ppt/slides/slide68.xml><?xml version="1.0" encoding="utf-8"?>
+<p:sld xmlns:a="http://schemas.openxmlformats.org/drawingml/2006/main" xmlns:r="http://schemas.openxmlformats.org/officeDocument/2006/relationships" xmlns:p="http://schemas.openxmlformats.org/presentationml/2006/main">
+  <p:cSld>
+    <p:spTree>
+      <p:nvGrpSpPr>
+        <p:cNvPr id="1" name="">
+          <a:extLst>
+            <a:ext uri="{FF2B5EF4-FFF2-40B4-BE49-F238E27FC236}">
+              <a16:creationId xmlns:a16="http://schemas.microsoft.com/office/drawing/2014/main" id="{493FC9AB-4EAD-0F9F-829C-73C06339367D}"/>
+            </a:ext>
+          </a:extLst>
+        </p:cNvPr>
+        <p:cNvGrpSpPr/>
+        <p:nvPr/>
+      </p:nvGrpSpPr>
+      <p:grpSpPr>
+        <a:xfrm>
+          <a:off x="0" y="0"/>
+          <a:ext cx="0" cy="0"/>
+          <a:chOff x="0" y="0"/>
+          <a:chExt cx="0" cy="0"/>
+        </a:xfrm>
+      </p:grpSpPr>
+      <p:sp>
+        <p:nvSpPr>
+          <p:cNvPr id="2" name="Titel 1">
+            <a:extLst>
+              <a:ext uri="{FF2B5EF4-FFF2-40B4-BE49-F238E27FC236}">
+                <a16:creationId xmlns:a16="http://schemas.microsoft.com/office/drawing/2014/main" id="{7CB10142-8629-2D9C-4699-F955FD152885}"/>
+              </a:ext>
+            </a:extLst>
+          </p:cNvPr>
+          <p:cNvSpPr>
+            <a:spLocks noGrp="1"/>
+          </p:cNvSpPr>
+          <p:nvPr>
+            <p:ph type="title"/>
+          </p:nvPr>
+        </p:nvSpPr>
+        <p:spPr>
+          <a:xfrm>
+            <a:off x="838200" y="365126"/>
+            <a:ext cx="10515600" cy="558800"/>
+          </a:xfrm>
+        </p:spPr>
+        <p:txBody>
+          <a:bodyPr>
+            <a:normAutofit/>
+          </a:bodyPr>
+          <a:lstStyle/>
+          <a:p>
+            <a:r>
+              <a:rPr lang="en-US" sz="2000"/>
+              <a:t>prepare_pcf_for_shift.py</a:t>
+            </a:r>
+          </a:p>
+        </p:txBody>
+      </p:sp>
+      <p:sp>
+        <p:nvSpPr>
+          <p:cNvPr id="5" name="Textfeld 4">
+            <a:extLst>
+              <a:ext uri="{FF2B5EF4-FFF2-40B4-BE49-F238E27FC236}">
+                <a16:creationId xmlns:a16="http://schemas.microsoft.com/office/drawing/2014/main" id="{C217033F-A3DC-45A0-BE88-974978C12119}"/>
+              </a:ext>
+            </a:extLst>
+          </p:cNvPr>
+          <p:cNvSpPr txBox="1"/>
+          <p:nvPr/>
+        </p:nvSpPr>
+        <p:spPr>
+          <a:xfrm>
+            <a:off x="838200" y="1048435"/>
+            <a:ext cx="6096000" cy="4801314"/>
+          </a:xfrm>
+          <a:prstGeom prst="rect">
+            <a:avLst/>
+          </a:prstGeom>
+          <a:noFill/>
+        </p:spPr>
+        <p:txBody>
+          <a:bodyPr wrap="square">
+            <a:spAutoFit/>
+          </a:bodyPr>
+          <a:lstStyle/>
+          <a:p>
+            <a:r>
+              <a:rPr lang="en-US" b="0">
+                <a:solidFill>
+                  <a:srgbClr val="DCDCAA"/>
+                </a:solidFill>
+                <a:effectLst/>
+                <a:latin typeface="Consolas" panose="020B0609020204030204" pitchFamily="49" charset="0"/>
+              </a:rPr>
+              <a:t>get_bondpartners</a:t>
+            </a:r>
+            <a:endParaRPr lang="en-US" sz="1800"/>
+          </a:p>
+          <a:p>
+            <a:r>
+              <a:rPr lang="en-US" sz="1800"/>
+              <a:t>    '''</a:t>
+            </a:r>
+          </a:p>
+          <a:p>
+            <a:r>
+              <a:rPr lang="en-US" sz="1800"/>
+              <a:t>    ------------------------------</a:t>
+            </a:r>
+          </a:p>
+          <a:p>
+            <a:r>
+              <a:rPr lang="en-US" sz="1800"/>
+              <a:t>    EFFECT: \\</a:t>
+            </a:r>
+          </a:p>
+          <a:p>
+            <a:r>
+              <a:rPr lang="en-US" sz="1800"/>
+              <a:t>    --------------- </a:t>
+            </a:r>
+          </a:p>
+          <a:p>
+            <a:r>
+              <a:rPr lang="en-US" sz="1800"/>
+              <a:t>    </a:t>
+            </a:r>
+            <a:r>
+              <a:rPr lang="en-US"/>
+              <a:t>reads all m1 atoms for a specific qm atom</a:t>
+            </a:r>
+            <a:endParaRPr lang="en-US" sz="1800"/>
+          </a:p>
+          <a:p>
+            <a:r>
+              <a:rPr lang="en-US" sz="1800"/>
+              <a:t>    ------------------------------</a:t>
+            </a:r>
+          </a:p>
+          <a:p>
+            <a:r>
+              <a:rPr lang="en-US" sz="1800"/>
+              <a:t>    INPUT: \\</a:t>
+            </a:r>
+          </a:p>
+          <a:p>
+            <a:r>
+              <a:rPr lang="en-US" sz="1800"/>
+              <a:t>    --------------- </a:t>
+            </a:r>
+          </a:p>
+          <a:p>
+            <a:r>
+              <a:rPr lang="en-US" sz="1800"/>
+              <a:t>    </a:t>
+            </a:r>
+            <a:r>
+              <a:rPr lang="en-US" b="0">
+                <a:solidFill>
+                  <a:srgbClr val="9CDCFE"/>
+                </a:solidFill>
+                <a:effectLst/>
+                <a:latin typeface="Consolas" panose="020B0609020204030204" pitchFamily="49" charset="0"/>
+              </a:rPr>
+              <a:t>connlist: list of atom connection</a:t>
+            </a:r>
+            <a:endParaRPr lang="en-US" b="0">
+              <a:solidFill>
+                <a:srgbClr val="CCCCCC"/>
+              </a:solidFill>
+              <a:effectLst/>
+              <a:latin typeface="Consolas" panose="020B0609020204030204" pitchFamily="49" charset="0"/>
+            </a:endParaRPr>
+          </a:p>
+          <a:p>
+            <a:r>
+              <a:rPr lang="en-US" b="0">
+                <a:solidFill>
+                  <a:srgbClr val="9CDCFE"/>
+                </a:solidFill>
+                <a:effectLst/>
+                <a:latin typeface="Consolas" panose="020B0609020204030204" pitchFamily="49" charset="0"/>
+              </a:rPr>
+              <a:t>  target: int, index of specific qm atom</a:t>
+            </a:r>
+            <a:endParaRPr lang="en-US" sz="1800"/>
+          </a:p>
+          <a:p>
+            <a:r>
+              <a:rPr lang="en-US" sz="1800"/>
+              <a:t>    ------------------------------</a:t>
+            </a:r>
+          </a:p>
+          <a:p>
+            <a:r>
+              <a:rPr lang="en-US" sz="1800"/>
+              <a:t>    RETURN: \\</a:t>
+            </a:r>
+          </a:p>
+          <a:p>
+            <a:r>
+              <a:rPr lang="en-US" sz="1800"/>
+              <a:t>    --------------- </a:t>
+            </a:r>
+          </a:p>
+          <a:p>
+            <a:r>
+              <a:rPr lang="en-US"/>
+              <a:t>    partnerlist: list of m1 atoms for this specific qm atom</a:t>
+            </a:r>
+            <a:endParaRPr lang="en-US" sz="1800"/>
+          </a:p>
+          <a:p>
+            <a:r>
+              <a:rPr lang="en-US" sz="1800"/>
+              <a:t>    ------------------------------</a:t>
+            </a:r>
+          </a:p>
+          <a:p>
+            <a:r>
+              <a:rPr lang="en-US" sz="1800"/>
+              <a:t>    '''</a:t>
+            </a:r>
+          </a:p>
+        </p:txBody>
+      </p:sp>
+    </p:spTree>
+    <p:extLst>
+      <p:ext uri="{BB962C8B-B14F-4D97-AF65-F5344CB8AC3E}">
+        <p14:creationId xmlns:p14="http://schemas.microsoft.com/office/powerpoint/2010/main" val="1037700930"/>
+      </p:ext>
+    </p:extLst>
+  </p:cSld>
+  <p:clrMapOvr>
+    <a:masterClrMapping/>
+  </p:clrMapOvr>
+</p:sld>
+</file>
+
+<file path=ppt/slides/slide69.xml><?xml version="1.0" encoding="utf-8"?>
+<p:sld xmlns:a="http://schemas.openxmlformats.org/drawingml/2006/main" xmlns:r="http://schemas.openxmlformats.org/officeDocument/2006/relationships" xmlns:p="http://schemas.openxmlformats.org/presentationml/2006/main">
+  <p:cSld>
+    <p:spTree>
+      <p:nvGrpSpPr>
+        <p:cNvPr id="1" name="">
+          <a:extLst>
+            <a:ext uri="{FF2B5EF4-FFF2-40B4-BE49-F238E27FC236}">
+              <a16:creationId xmlns:a16="http://schemas.microsoft.com/office/drawing/2014/main" id="{4AEFE690-AD22-0BCF-2698-B05C2BC65D79}"/>
+            </a:ext>
+          </a:extLst>
+        </p:cNvPr>
+        <p:cNvGrpSpPr/>
+        <p:nvPr/>
+      </p:nvGrpSpPr>
+      <p:grpSpPr>
+        <a:xfrm>
+          <a:off x="0" y="0"/>
+          <a:ext cx="0" cy="0"/>
+          <a:chOff x="0" y="0"/>
+          <a:chExt cx="0" cy="0"/>
+        </a:xfrm>
+      </p:grpSpPr>
+      <p:sp>
+        <p:nvSpPr>
+          <p:cNvPr id="2" name="Titel 1">
+            <a:extLst>
+              <a:ext uri="{FF2B5EF4-FFF2-40B4-BE49-F238E27FC236}">
+                <a16:creationId xmlns:a16="http://schemas.microsoft.com/office/drawing/2014/main" id="{D9918C17-17E8-731D-C887-223034CB97B2}"/>
+              </a:ext>
+            </a:extLst>
+          </p:cNvPr>
+          <p:cNvSpPr>
+            <a:spLocks noGrp="1"/>
+          </p:cNvSpPr>
+          <p:nvPr>
+            <p:ph type="title"/>
+          </p:nvPr>
+        </p:nvSpPr>
+        <p:spPr>
+          <a:xfrm>
+            <a:off x="838200" y="365126"/>
+            <a:ext cx="10515600" cy="558800"/>
+          </a:xfrm>
+        </p:spPr>
+        <p:txBody>
+          <a:bodyPr>
+            <a:normAutofit/>
+          </a:bodyPr>
+          <a:lstStyle/>
+          <a:p>
+            <a:r>
+              <a:rPr lang="en-US" sz="2000"/>
+              <a:t>prepare_pcf_for_shift.py</a:t>
+            </a:r>
+          </a:p>
+        </p:txBody>
+      </p:sp>
+      <p:sp>
+        <p:nvSpPr>
+          <p:cNvPr id="5" name="Textfeld 4">
+            <a:extLst>
+              <a:ext uri="{FF2B5EF4-FFF2-40B4-BE49-F238E27FC236}">
+                <a16:creationId xmlns:a16="http://schemas.microsoft.com/office/drawing/2014/main" id="{BDF88597-5148-1DE7-264B-395F7AA3EFA2}"/>
+              </a:ext>
+            </a:extLst>
+          </p:cNvPr>
+          <p:cNvSpPr txBox="1"/>
+          <p:nvPr/>
+        </p:nvSpPr>
+        <p:spPr>
+          <a:xfrm>
+            <a:off x="838200" y="1048435"/>
+            <a:ext cx="7554686" cy="6463308"/>
+          </a:xfrm>
+          <a:prstGeom prst="rect">
+            <a:avLst/>
+          </a:prstGeom>
+          <a:noFill/>
+        </p:spPr>
+        <p:txBody>
+          <a:bodyPr wrap="square">
+            <a:spAutoFit/>
+          </a:bodyPr>
+          <a:lstStyle/>
+          <a:p>
+            <a:r>
+              <a:rPr lang="en-US" b="0">
+                <a:solidFill>
+                  <a:srgbClr val="DCDCAA"/>
+                </a:solidFill>
+                <a:effectLst/>
+                <a:latin typeface="Consolas" panose="020B0609020204030204" pitchFamily="49" charset="0"/>
+              </a:rPr>
+              <a:t>prepare_pcf_for_shift_fieldsonly</a:t>
+            </a:r>
+            <a:endParaRPr lang="en-US" sz="1800"/>
+          </a:p>
+          <a:p>
+            <a:r>
+              <a:rPr lang="en-US" sz="1800"/>
+              <a:t>    '''</a:t>
+            </a:r>
+          </a:p>
+          <a:p>
+            <a:r>
+              <a:rPr lang="en-US" sz="1800"/>
+              <a:t>    ------------------------------</a:t>
+            </a:r>
+          </a:p>
+          <a:p>
+            <a:r>
+              <a:rPr lang="en-US" sz="1800"/>
+              <a:t>    EFFECT: \\</a:t>
+            </a:r>
+          </a:p>
+          <a:p>
+            <a:r>
+              <a:rPr lang="en-US" sz="1800"/>
+              <a:t>    --------------- </a:t>
+            </a:r>
+          </a:p>
+          <a:p>
+            <a:r>
+              <a:rPr lang="en-US" sz="1800"/>
+              <a:t>    </a:t>
+            </a:r>
+            <a:r>
+              <a:rPr lang="en-US"/>
+              <a:t>prepares m1 and m2 atom lists and </a:t>
+            </a:r>
+            <a:r>
+              <a:rPr lang="en-US" b="0">
+                <a:solidFill>
+                  <a:srgbClr val="CE9178"/>
+                </a:solidFill>
+                <a:effectLst/>
+                <a:latin typeface="Consolas" panose="020B0609020204030204" pitchFamily="49" charset="0"/>
+              </a:rPr>
+              <a:t>returns correct charges</a:t>
+            </a:r>
+            <a:endParaRPr lang="en-US" sz="1800"/>
+          </a:p>
+          <a:p>
+            <a:r>
+              <a:rPr lang="en-US" sz="1800"/>
+              <a:t>    ------------------------------</a:t>
+            </a:r>
+          </a:p>
+          <a:p>
+            <a:r>
+              <a:rPr lang="en-US" sz="1800"/>
+              <a:t>    INPUT: \\</a:t>
+            </a:r>
+          </a:p>
+          <a:p>
+            <a:r>
+              <a:rPr lang="en-US" sz="1800"/>
+              <a:t>    --------------- </a:t>
+            </a:r>
+          </a:p>
+          <a:p>
+            <a:r>
+              <a:rPr lang="en-US" sz="1800"/>
+              <a:t>    </a:t>
+            </a:r>
+            <a:r>
+              <a:rPr lang="en-US" b="0">
+                <a:solidFill>
+                  <a:srgbClr val="9CDCFE"/>
+                </a:solidFill>
+                <a:effectLst/>
+                <a:latin typeface="Consolas" panose="020B0609020204030204" pitchFamily="49" charset="0"/>
+              </a:rPr>
+              <a:t>charges: list, xyzq</a:t>
+            </a:r>
+            <a:endParaRPr lang="en-US" b="0">
+              <a:solidFill>
+                <a:srgbClr val="CCCCCC"/>
+              </a:solidFill>
+              <a:effectLst/>
+              <a:latin typeface="Consolas" panose="020B0609020204030204" pitchFamily="49" charset="0"/>
+            </a:endParaRPr>
+          </a:p>
+          <a:p>
+            <a:r>
+              <a:rPr lang="en-US" b="0">
+                <a:solidFill>
+                  <a:srgbClr val="9CDCFE"/>
+                </a:solidFill>
+                <a:effectLst/>
+                <a:latin typeface="Consolas" panose="020B0609020204030204" pitchFamily="49" charset="0"/>
+              </a:rPr>
+              <a:t>  qmatomlist: list of qm atom indices</a:t>
+            </a:r>
+            <a:endParaRPr lang="en-US">
+              <a:solidFill>
+                <a:srgbClr val="CCCCCC"/>
+              </a:solidFill>
+              <a:latin typeface="Consolas" panose="020B0609020204030204" pitchFamily="49" charset="0"/>
+            </a:endParaRPr>
+          </a:p>
+          <a:p>
+            <a:r>
+              <a:rPr lang="en-US" b="0">
+                <a:solidFill>
+                  <a:srgbClr val="9CDCFE"/>
+                </a:solidFill>
+                <a:effectLst/>
+                <a:latin typeface="Consolas" panose="020B0609020204030204" pitchFamily="49" charset="0"/>
+              </a:rPr>
+              <a:t>  qmcharge</a:t>
+            </a:r>
+            <a:r>
+              <a:rPr lang="en-US">
+                <a:solidFill>
+                  <a:srgbClr val="CCCCCC"/>
+                </a:solidFill>
+                <a:latin typeface="Consolas" panose="020B0609020204030204" pitchFamily="49" charset="0"/>
+              </a:rPr>
+              <a:t>:</a:t>
+            </a:r>
+            <a:r>
+              <a:rPr lang="en-US" b="0">
+                <a:solidFill>
+                  <a:srgbClr val="CCCCCC"/>
+                </a:solidFill>
+                <a:effectLst/>
+                <a:latin typeface="Consolas" panose="020B0609020204030204" pitchFamily="49" charset="0"/>
+              </a:rPr>
+              <a:t> int, </a:t>
+            </a:r>
+            <a:r>
+              <a:rPr lang="de-DE" b="0">
+                <a:solidFill>
+                  <a:srgbClr val="CCCCCC"/>
+                </a:solidFill>
+                <a:effectLst/>
+                <a:latin typeface="Consolas" panose="020B0609020204030204" pitchFamily="49" charset="0"/>
+              </a:rPr>
+              <a:t>total qm charge</a:t>
+            </a:r>
+          </a:p>
+          <a:p>
+            <a:r>
+              <a:rPr lang="en-US" b="0">
+                <a:solidFill>
+                  <a:srgbClr val="9CDCFE"/>
+                </a:solidFill>
+                <a:effectLst/>
+                <a:latin typeface="Consolas" panose="020B0609020204030204" pitchFamily="49" charset="0"/>
+              </a:rPr>
+              <a:t>  connlist: list of atom connection</a:t>
+            </a:r>
+            <a:endParaRPr lang="en-US" sz="1800"/>
+          </a:p>
+          <a:p>
+            <a:r>
+              <a:rPr lang="en-US" sz="1800"/>
+              <a:t>    ------------------------------</a:t>
+            </a:r>
+          </a:p>
+          <a:p>
+            <a:r>
+              <a:rPr lang="en-US" sz="1800"/>
+              <a:t>    RETURN: \\</a:t>
+            </a:r>
+          </a:p>
+          <a:p>
+            <a:r>
+              <a:rPr lang="en-US" sz="1800"/>
+              <a:t>    --------------- </a:t>
+            </a:r>
+          </a:p>
+          <a:p>
+            <a:r>
+              <a:rPr lang="en-US"/>
+              <a:t>    </a:t>
+            </a:r>
+            <a:r>
+              <a:rPr lang="en-US" b="0">
+                <a:solidFill>
+                  <a:srgbClr val="9CDCFE"/>
+                </a:solidFill>
+                <a:effectLst/>
+                <a:latin typeface="Consolas" panose="020B0609020204030204" pitchFamily="49" charset="0"/>
+              </a:rPr>
+              <a:t>qmcoordlist: list of xyzq coordinates for all qm atoms</a:t>
+            </a:r>
+          </a:p>
+          <a:p>
+            <a:r>
+              <a:rPr lang="en-US" b="0">
+                <a:solidFill>
+                  <a:srgbClr val="9CDCFE"/>
+                </a:solidFill>
+                <a:effectLst/>
+                <a:latin typeface="Consolas" panose="020B0609020204030204" pitchFamily="49" charset="0"/>
+              </a:rPr>
+              <a:t>m1list: list of m1 atom indices</a:t>
+            </a:r>
+          </a:p>
+          <a:p>
+            <a:r>
+              <a:rPr lang="en-US" b="0">
+                <a:solidFill>
+                  <a:srgbClr val="9CDCFE"/>
+                </a:solidFill>
+                <a:effectLst/>
+                <a:latin typeface="Consolas" panose="020B0609020204030204" pitchFamily="49" charset="0"/>
+              </a:rPr>
+              <a:t>m2list: list of m2 atom indices</a:t>
+            </a:r>
+          </a:p>
+          <a:p>
+            <a:r>
+              <a:rPr lang="en-US" b="0">
+                <a:solidFill>
+                  <a:srgbClr val="9CDCFE"/>
+                </a:solidFill>
+                <a:effectLst/>
+                <a:latin typeface="Consolas" panose="020B0609020204030204" pitchFamily="49" charset="0"/>
+              </a:rPr>
+              <a:t>updated_chargelist</a:t>
+            </a:r>
+            <a:r>
+              <a:rPr lang="en-US">
+                <a:solidFill>
+                  <a:srgbClr val="CCCCCC"/>
+                </a:solidFill>
+                <a:latin typeface="Consolas" panose="020B0609020204030204" pitchFamily="49" charset="0"/>
+              </a:rPr>
+              <a:t>: list of new xyzq coordinates updated for qm region and charge shifts</a:t>
+            </a:r>
+            <a:endParaRPr lang="en-US" sz="1800"/>
+          </a:p>
+          <a:p>
+            <a:r>
+              <a:rPr lang="en-US" sz="1800"/>
+              <a:t>    ------------------------------</a:t>
+            </a:r>
+          </a:p>
+          <a:p>
+            <a:r>
+              <a:rPr lang="en-US" sz="1800"/>
+              <a:t>    '''</a:t>
+            </a:r>
+          </a:p>
+        </p:txBody>
+      </p:sp>
+    </p:spTree>
+    <p:extLst>
+      <p:ext uri="{BB962C8B-B14F-4D97-AF65-F5344CB8AC3E}">
+        <p14:creationId xmlns:p14="http://schemas.microsoft.com/office/powerpoint/2010/main" val="3778212967"/>
       </p:ext>
     </p:extLst>
   </p:cSld>
@@ -16228,6 +19378,855 @@
     <p:extLst>
       <p:ext uri="{BB962C8B-B14F-4D97-AF65-F5344CB8AC3E}">
         <p14:creationId xmlns:p14="http://schemas.microsoft.com/office/powerpoint/2010/main" val="2797972111"/>
+      </p:ext>
+    </p:extLst>
+  </p:cSld>
+  <p:clrMapOvr>
+    <a:masterClrMapping/>
+  </p:clrMapOvr>
+</p:sld>
+</file>
+
+<file path=ppt/slides/slide70.xml><?xml version="1.0" encoding="utf-8"?>
+<p:sld xmlns:a="http://schemas.openxmlformats.org/drawingml/2006/main" xmlns:r="http://schemas.openxmlformats.org/officeDocument/2006/relationships" xmlns:p="http://schemas.openxmlformats.org/presentationml/2006/main">
+  <p:cSld>
+    <p:spTree>
+      <p:nvGrpSpPr>
+        <p:cNvPr id="1" name="">
+          <a:extLst>
+            <a:ext uri="{FF2B5EF4-FFF2-40B4-BE49-F238E27FC236}">
+              <a16:creationId xmlns:a16="http://schemas.microsoft.com/office/drawing/2014/main" id="{CA99CE40-AA65-3992-2292-063B6FE2A591}"/>
+            </a:ext>
+          </a:extLst>
+        </p:cNvPr>
+        <p:cNvGrpSpPr/>
+        <p:nvPr/>
+      </p:nvGrpSpPr>
+      <p:grpSpPr>
+        <a:xfrm>
+          <a:off x="0" y="0"/>
+          <a:ext cx="0" cy="0"/>
+          <a:chOff x="0" y="0"/>
+          <a:chExt cx="0" cy="0"/>
+        </a:xfrm>
+      </p:grpSpPr>
+      <p:sp>
+        <p:nvSpPr>
+          <p:cNvPr id="2" name="Titel 1">
+            <a:extLst>
+              <a:ext uri="{FF2B5EF4-FFF2-40B4-BE49-F238E27FC236}">
+                <a16:creationId xmlns:a16="http://schemas.microsoft.com/office/drawing/2014/main" id="{7B3DC08D-A486-2174-C3E5-13BF36A39FE4}"/>
+              </a:ext>
+            </a:extLst>
+          </p:cNvPr>
+          <p:cNvSpPr>
+            <a:spLocks noGrp="1"/>
+          </p:cNvSpPr>
+          <p:nvPr>
+            <p:ph type="title"/>
+          </p:nvPr>
+        </p:nvSpPr>
+        <p:spPr>
+          <a:xfrm>
+            <a:off x="838200" y="365126"/>
+            <a:ext cx="10515600" cy="558800"/>
+          </a:xfrm>
+        </p:spPr>
+        <p:txBody>
+          <a:bodyPr>
+            <a:normAutofit/>
+          </a:bodyPr>
+          <a:lstStyle/>
+          <a:p>
+            <a:r>
+              <a:rPr lang="en-US" sz="2000"/>
+              <a:t>prepare_pcf_for_shift.py</a:t>
+            </a:r>
+          </a:p>
+        </p:txBody>
+      </p:sp>
+      <p:sp>
+        <p:nvSpPr>
+          <p:cNvPr id="5" name="Textfeld 4">
+            <a:extLst>
+              <a:ext uri="{FF2B5EF4-FFF2-40B4-BE49-F238E27FC236}">
+                <a16:creationId xmlns:a16="http://schemas.microsoft.com/office/drawing/2014/main" id="{A021B68D-F8AE-7844-D5E2-A5A81ED0D0C9}"/>
+              </a:ext>
+            </a:extLst>
+          </p:cNvPr>
+          <p:cNvSpPr txBox="1"/>
+          <p:nvPr/>
+        </p:nvSpPr>
+        <p:spPr>
+          <a:xfrm>
+            <a:off x="838200" y="1048435"/>
+            <a:ext cx="6096000" cy="4801314"/>
+          </a:xfrm>
+          <a:prstGeom prst="rect">
+            <a:avLst/>
+          </a:prstGeom>
+          <a:noFill/>
+        </p:spPr>
+        <p:txBody>
+          <a:bodyPr wrap="square">
+            <a:spAutoFit/>
+          </a:bodyPr>
+          <a:lstStyle/>
+          <a:p>
+            <a:r>
+              <a:rPr lang="en-US" b="0">
+                <a:solidFill>
+                  <a:srgbClr val="DCDCAA"/>
+                </a:solidFill>
+                <a:effectLst/>
+                <a:latin typeface="Consolas" panose="020B0609020204030204" pitchFamily="49" charset="0"/>
+              </a:rPr>
+              <a:t>get_qmcoords</a:t>
+            </a:r>
+            <a:endParaRPr lang="en-US" sz="1800"/>
+          </a:p>
+          <a:p>
+            <a:r>
+              <a:rPr lang="en-US" sz="1800"/>
+              <a:t>    '''</a:t>
+            </a:r>
+          </a:p>
+          <a:p>
+            <a:r>
+              <a:rPr lang="en-US" sz="1800"/>
+              <a:t>    ------------------------------</a:t>
+            </a:r>
+          </a:p>
+          <a:p>
+            <a:r>
+              <a:rPr lang="en-US" sz="1800"/>
+              <a:t>    EFFECT: \\</a:t>
+            </a:r>
+          </a:p>
+          <a:p>
+            <a:r>
+              <a:rPr lang="en-US" sz="1800"/>
+              <a:t>    --------------- </a:t>
+            </a:r>
+          </a:p>
+          <a:p>
+            <a:r>
+              <a:rPr lang="en-US" sz="1800"/>
+              <a:t>    </a:t>
+            </a:r>
+            <a:r>
+              <a:rPr lang="en-US"/>
+              <a:t>reads xyzq of qm atoms</a:t>
+            </a:r>
+            <a:endParaRPr lang="en-US" sz="1800"/>
+          </a:p>
+          <a:p>
+            <a:r>
+              <a:rPr lang="en-US" sz="1800"/>
+              <a:t>    ------------------------------</a:t>
+            </a:r>
+          </a:p>
+          <a:p>
+            <a:r>
+              <a:rPr lang="en-US" sz="1800"/>
+              <a:t>    INPUT: \\</a:t>
+            </a:r>
+          </a:p>
+          <a:p>
+            <a:r>
+              <a:rPr lang="en-US" sz="1800"/>
+              <a:t>    --------------- </a:t>
+            </a:r>
+          </a:p>
+          <a:p>
+            <a:r>
+              <a:rPr lang="en-US" sz="1800"/>
+              <a:t>    </a:t>
+            </a:r>
+            <a:r>
+              <a:rPr lang="en-US" b="0">
+                <a:solidFill>
+                  <a:srgbClr val="9CDCFE"/>
+                </a:solidFill>
+                <a:effectLst/>
+                <a:latin typeface="Consolas" panose="020B0609020204030204" pitchFamily="49" charset="0"/>
+              </a:rPr>
+              <a:t>qmatoms: list of qm atom indices</a:t>
+            </a:r>
+          </a:p>
+          <a:p>
+            <a:r>
+              <a:rPr lang="en-US" b="0">
+                <a:solidFill>
+                  <a:srgbClr val="9CDCFE"/>
+                </a:solidFill>
+                <a:effectLst/>
+                <a:latin typeface="Consolas" panose="020B0609020204030204" pitchFamily="49" charset="0"/>
+              </a:rPr>
+              <a:t>charges</a:t>
+            </a:r>
+            <a:r>
+              <a:rPr lang="en-US">
+                <a:solidFill>
+                  <a:srgbClr val="CCCCCC"/>
+                </a:solidFill>
+                <a:latin typeface="Consolas" panose="020B0609020204030204" pitchFamily="49" charset="0"/>
+              </a:rPr>
+              <a:t>: </a:t>
+            </a:r>
+            <a:r>
+              <a:rPr lang="en-US" b="0">
+                <a:solidFill>
+                  <a:srgbClr val="9CDCFE"/>
+                </a:solidFill>
+                <a:effectLst/>
+                <a:latin typeface="Consolas" panose="020B0609020204030204" pitchFamily="49" charset="0"/>
+              </a:rPr>
+              <a:t>list, xyzq</a:t>
+            </a:r>
+            <a:endParaRPr lang="en-US" b="0">
+              <a:solidFill>
+                <a:srgbClr val="CCCCCC"/>
+              </a:solidFill>
+              <a:effectLst/>
+              <a:latin typeface="Consolas" panose="020B0609020204030204" pitchFamily="49" charset="0"/>
+            </a:endParaRPr>
+          </a:p>
+          <a:p>
+            <a:r>
+              <a:rPr lang="en-US" sz="1800"/>
+              <a:t>    ------------------------------</a:t>
+            </a:r>
+          </a:p>
+          <a:p>
+            <a:r>
+              <a:rPr lang="en-US" sz="1800"/>
+              <a:t>    RETURN: \\</a:t>
+            </a:r>
+          </a:p>
+          <a:p>
+            <a:r>
+              <a:rPr lang="en-US" sz="1800"/>
+              <a:t>    --------------- </a:t>
+            </a:r>
+          </a:p>
+          <a:p>
+            <a:r>
+              <a:rPr lang="en-US"/>
+              <a:t> </a:t>
+            </a:r>
+            <a:r>
+              <a:rPr lang="en-US" b="0">
+                <a:solidFill>
+                  <a:srgbClr val="9CDCFE"/>
+                </a:solidFill>
+                <a:effectLst/>
+                <a:latin typeface="Consolas" panose="020B0609020204030204" pitchFamily="49" charset="0"/>
+              </a:rPr>
+              <a:t>qmcoordlist</a:t>
+            </a:r>
+            <a:r>
+              <a:rPr lang="en-US" b="0">
+                <a:solidFill>
+                  <a:srgbClr val="CCCCCC"/>
+                </a:solidFill>
+                <a:effectLst/>
+                <a:latin typeface="Consolas" panose="020B0609020204030204" pitchFamily="49" charset="0"/>
+              </a:rPr>
+              <a:t>: list of xyzq for qm atoms</a:t>
+            </a:r>
+            <a:endParaRPr lang="en-US" sz="1800"/>
+          </a:p>
+          <a:p>
+            <a:r>
+              <a:rPr lang="en-US" sz="1800"/>
+              <a:t>    ------------------------------</a:t>
+            </a:r>
+          </a:p>
+          <a:p>
+            <a:r>
+              <a:rPr lang="en-US" sz="1800"/>
+              <a:t>    '''</a:t>
+            </a:r>
+          </a:p>
+        </p:txBody>
+      </p:sp>
+    </p:spTree>
+    <p:extLst>
+      <p:ext uri="{BB962C8B-B14F-4D97-AF65-F5344CB8AC3E}">
+        <p14:creationId xmlns:p14="http://schemas.microsoft.com/office/powerpoint/2010/main" val="544776653"/>
+      </p:ext>
+    </p:extLst>
+  </p:cSld>
+  <p:clrMapOvr>
+    <a:masterClrMapping/>
+  </p:clrMapOvr>
+</p:sld>
+</file>
+
+<file path=ppt/slides/slide71.xml><?xml version="1.0" encoding="utf-8"?>
+<p:sld xmlns:a="http://schemas.openxmlformats.org/drawingml/2006/main" xmlns:r="http://schemas.openxmlformats.org/officeDocument/2006/relationships" xmlns:p="http://schemas.openxmlformats.org/presentationml/2006/main">
+  <p:cSld>
+    <p:spTree>
+      <p:nvGrpSpPr>
+        <p:cNvPr id="1" name="">
+          <a:extLst>
+            <a:ext uri="{FF2B5EF4-FFF2-40B4-BE49-F238E27FC236}">
+              <a16:creationId xmlns:a16="http://schemas.microsoft.com/office/drawing/2014/main" id="{1C7C44FB-A358-144E-068A-F285FCAB2300}"/>
+            </a:ext>
+          </a:extLst>
+        </p:cNvPr>
+        <p:cNvGrpSpPr/>
+        <p:nvPr/>
+      </p:nvGrpSpPr>
+      <p:grpSpPr>
+        <a:xfrm>
+          <a:off x="0" y="0"/>
+          <a:ext cx="0" cy="0"/>
+          <a:chOff x="0" y="0"/>
+          <a:chExt cx="0" cy="0"/>
+        </a:xfrm>
+      </p:grpSpPr>
+      <p:sp>
+        <p:nvSpPr>
+          <p:cNvPr id="2" name="Titel 1">
+            <a:extLst>
+              <a:ext uri="{FF2B5EF4-FFF2-40B4-BE49-F238E27FC236}">
+                <a16:creationId xmlns:a16="http://schemas.microsoft.com/office/drawing/2014/main" id="{F5306838-6923-FC54-D286-B68CCD4B3407}"/>
+              </a:ext>
+            </a:extLst>
+          </p:cNvPr>
+          <p:cNvSpPr>
+            <a:spLocks noGrp="1"/>
+          </p:cNvSpPr>
+          <p:nvPr>
+            <p:ph type="title"/>
+          </p:nvPr>
+        </p:nvSpPr>
+        <p:spPr>
+          <a:xfrm>
+            <a:off x="838200" y="365126"/>
+            <a:ext cx="10515600" cy="558800"/>
+          </a:xfrm>
+        </p:spPr>
+        <p:txBody>
+          <a:bodyPr>
+            <a:normAutofit/>
+          </a:bodyPr>
+          <a:lstStyle/>
+          <a:p>
+            <a:r>
+              <a:rPr lang="en-US" sz="2000"/>
+              <a:t>prepare_pcf_for_shift.py</a:t>
+            </a:r>
+          </a:p>
+        </p:txBody>
+      </p:sp>
+      <p:sp>
+        <p:nvSpPr>
+          <p:cNvPr id="5" name="Textfeld 4">
+            <a:extLst>
+              <a:ext uri="{FF2B5EF4-FFF2-40B4-BE49-F238E27FC236}">
+                <a16:creationId xmlns:a16="http://schemas.microsoft.com/office/drawing/2014/main" id="{2164BC79-C190-058C-39FC-BE283E0BD1A0}"/>
+              </a:ext>
+            </a:extLst>
+          </p:cNvPr>
+          <p:cNvSpPr txBox="1"/>
+          <p:nvPr/>
+        </p:nvSpPr>
+        <p:spPr>
+          <a:xfrm>
+            <a:off x="838200" y="1048435"/>
+            <a:ext cx="6096000" cy="5632311"/>
+          </a:xfrm>
+          <a:prstGeom prst="rect">
+            <a:avLst/>
+          </a:prstGeom>
+          <a:noFill/>
+        </p:spPr>
+        <p:txBody>
+          <a:bodyPr wrap="square">
+            <a:spAutoFit/>
+          </a:bodyPr>
+          <a:lstStyle/>
+          <a:p>
+            <a:r>
+              <a:rPr lang="en-US" b="0">
+                <a:solidFill>
+                  <a:srgbClr val="DCDCAA"/>
+                </a:solidFill>
+                <a:effectLst/>
+                <a:latin typeface="Consolas" panose="020B0609020204030204" pitchFamily="49" charset="0"/>
+              </a:rPr>
+              <a:t>eliminate_and_shift_to_m1</a:t>
+            </a:r>
+            <a:endParaRPr lang="en-US" sz="1800"/>
+          </a:p>
+          <a:p>
+            <a:r>
+              <a:rPr lang="en-US" sz="1800"/>
+              <a:t>    '''</a:t>
+            </a:r>
+          </a:p>
+          <a:p>
+            <a:r>
+              <a:rPr lang="en-US" sz="1800"/>
+              <a:t>    ------------------------------</a:t>
+            </a:r>
+          </a:p>
+          <a:p>
+            <a:r>
+              <a:rPr lang="en-US" sz="1800"/>
+              <a:t>    EFFECT: \\</a:t>
+            </a:r>
+          </a:p>
+          <a:p>
+            <a:r>
+              <a:rPr lang="en-US" sz="1800"/>
+              <a:t>    --------------- </a:t>
+            </a:r>
+          </a:p>
+          <a:p>
+            <a:r>
+              <a:rPr lang="en-US" sz="1800"/>
+              <a:t>    </a:t>
+            </a:r>
+            <a:r>
+              <a:rPr lang="en-US"/>
+              <a:t>removes qm charges and shifts them to m1 atoms</a:t>
+            </a:r>
+            <a:endParaRPr lang="en-US" sz="1800"/>
+          </a:p>
+          <a:p>
+            <a:r>
+              <a:rPr lang="en-US" sz="1800"/>
+              <a:t>    ------------------------------</a:t>
+            </a:r>
+          </a:p>
+          <a:p>
+            <a:r>
+              <a:rPr lang="en-US" sz="1800"/>
+              <a:t>    INPUT: \\</a:t>
+            </a:r>
+          </a:p>
+          <a:p>
+            <a:r>
+              <a:rPr lang="en-US" sz="1800"/>
+              <a:t>    --------------- </a:t>
+            </a:r>
+          </a:p>
+          <a:p>
+            <a:r>
+              <a:rPr lang="en-US" sz="1800"/>
+              <a:t>    </a:t>
+            </a:r>
+            <a:r>
+              <a:rPr lang="fr-FR" b="0">
+                <a:solidFill>
+                  <a:srgbClr val="9CDCFE"/>
+                </a:solidFill>
+                <a:effectLst/>
+                <a:latin typeface="Consolas" panose="020B0609020204030204" pitchFamily="49" charset="0"/>
+              </a:rPr>
+              <a:t>qmatoms:</a:t>
+            </a:r>
+            <a:r>
+              <a:rPr lang="en-US" b="0">
+                <a:solidFill>
+                  <a:srgbClr val="9CDCFE"/>
+                </a:solidFill>
+                <a:effectLst/>
+                <a:latin typeface="Consolas" panose="020B0609020204030204" pitchFamily="49" charset="0"/>
+              </a:rPr>
+              <a:t> list of qm atom indices</a:t>
+            </a:r>
+            <a:endParaRPr lang="fr-FR" b="0">
+              <a:solidFill>
+                <a:srgbClr val="9CDCFE"/>
+              </a:solidFill>
+              <a:effectLst/>
+              <a:latin typeface="Consolas" panose="020B0609020204030204" pitchFamily="49" charset="0"/>
+            </a:endParaRPr>
+          </a:p>
+          <a:p>
+            <a:r>
+              <a:rPr lang="fr-FR" b="0">
+                <a:solidFill>
+                  <a:srgbClr val="9CDCFE"/>
+                </a:solidFill>
+                <a:effectLst/>
+                <a:latin typeface="Consolas" panose="020B0609020204030204" pitchFamily="49" charset="0"/>
+              </a:rPr>
+              <a:t>charges:</a:t>
+            </a:r>
+            <a:r>
+              <a:rPr lang="en-US" b="0">
+                <a:solidFill>
+                  <a:srgbClr val="9CDCFE"/>
+                </a:solidFill>
+                <a:effectLst/>
+                <a:latin typeface="Consolas" panose="020B0609020204030204" pitchFamily="49" charset="0"/>
+              </a:rPr>
+              <a:t> list, xyzq</a:t>
+            </a:r>
+            <a:endParaRPr lang="fr-FR" b="0">
+              <a:solidFill>
+                <a:srgbClr val="9CDCFE"/>
+              </a:solidFill>
+              <a:effectLst/>
+              <a:latin typeface="Consolas" panose="020B0609020204030204" pitchFamily="49" charset="0"/>
+            </a:endParaRPr>
+          </a:p>
+          <a:p>
+            <a:r>
+              <a:rPr lang="fr-FR" b="0">
+                <a:solidFill>
+                  <a:srgbClr val="9CDCFE"/>
+                </a:solidFill>
+                <a:effectLst/>
+                <a:latin typeface="Consolas" panose="020B0609020204030204" pitchFamily="49" charset="0"/>
+              </a:rPr>
+              <a:t>m1list: </a:t>
+            </a:r>
+            <a:r>
+              <a:rPr lang="en-US" b="0">
+                <a:solidFill>
+                  <a:srgbClr val="9CDCFE"/>
+                </a:solidFill>
+                <a:effectLst/>
+                <a:latin typeface="Consolas" panose="020B0609020204030204" pitchFamily="49" charset="0"/>
+              </a:rPr>
+              <a:t>list of m1 atom indices</a:t>
+            </a:r>
+            <a:endParaRPr lang="fr-FR" b="0">
+              <a:solidFill>
+                <a:srgbClr val="9CDCFE"/>
+              </a:solidFill>
+              <a:effectLst/>
+              <a:latin typeface="Consolas" panose="020B0609020204030204" pitchFamily="49" charset="0"/>
+            </a:endParaRPr>
+          </a:p>
+          <a:p>
+            <a:r>
+              <a:rPr lang="fr-FR" b="0">
+                <a:solidFill>
+                  <a:srgbClr val="9CDCFE"/>
+                </a:solidFill>
+                <a:effectLst/>
+                <a:latin typeface="Consolas" panose="020B0609020204030204" pitchFamily="49" charset="0"/>
+              </a:rPr>
+              <a:t>qmcharge: </a:t>
+            </a:r>
+            <a:r>
+              <a:rPr lang="en-US" b="0">
+                <a:solidFill>
+                  <a:srgbClr val="CCCCCC"/>
+                </a:solidFill>
+                <a:effectLst/>
+                <a:latin typeface="Consolas" panose="020B0609020204030204" pitchFamily="49" charset="0"/>
+              </a:rPr>
+              <a:t>int, </a:t>
+            </a:r>
+            <a:r>
+              <a:rPr lang="de-DE" b="0">
+                <a:solidFill>
+                  <a:srgbClr val="CCCCCC"/>
+                </a:solidFill>
+                <a:effectLst/>
+                <a:latin typeface="Consolas" panose="020B0609020204030204" pitchFamily="49" charset="0"/>
+              </a:rPr>
+              <a:t>total qm charge</a:t>
+            </a:r>
+            <a:endParaRPr lang="fr-FR" b="0">
+              <a:solidFill>
+                <a:srgbClr val="9CDCFE"/>
+              </a:solidFill>
+              <a:effectLst/>
+              <a:latin typeface="Consolas" panose="020B0609020204030204" pitchFamily="49" charset="0"/>
+            </a:endParaRPr>
+          </a:p>
+          <a:p>
+            <a:r>
+              <a:rPr lang="fr-FR" b="0">
+                <a:solidFill>
+                  <a:srgbClr val="9CDCFE"/>
+                </a:solidFill>
+                <a:effectLst/>
+                <a:latin typeface="Consolas" panose="020B0609020204030204" pitchFamily="49" charset="0"/>
+              </a:rPr>
+              <a:t>qmcoordsq: </a:t>
+            </a:r>
+            <a:r>
+              <a:rPr lang="en-US" b="0">
+                <a:solidFill>
+                  <a:srgbClr val="CCCCCC"/>
+                </a:solidFill>
+                <a:effectLst/>
+                <a:latin typeface="Consolas" panose="020B0609020204030204" pitchFamily="49" charset="0"/>
+              </a:rPr>
+              <a:t>list of xyzq for qm atoms</a:t>
+            </a:r>
+            <a:endParaRPr lang="en-US" sz="1800"/>
+          </a:p>
+          <a:p>
+            <a:r>
+              <a:rPr lang="en-US" sz="1800"/>
+              <a:t>    ------------------------------</a:t>
+            </a:r>
+          </a:p>
+          <a:p>
+            <a:r>
+              <a:rPr lang="en-US" sz="1800"/>
+              <a:t>    RETURN: \\</a:t>
+            </a:r>
+          </a:p>
+          <a:p>
+            <a:r>
+              <a:rPr lang="en-US" sz="1800"/>
+              <a:t>    --------------- </a:t>
+            </a:r>
+          </a:p>
+          <a:p>
+            <a:r>
+              <a:rPr lang="en-US"/>
+              <a:t> </a:t>
+            </a:r>
+            <a:r>
+              <a:rPr lang="en-US" b="0">
+                <a:solidFill>
+                  <a:srgbClr val="9CDCFE"/>
+                </a:solidFill>
+                <a:effectLst/>
+                <a:latin typeface="Consolas" panose="020B0609020204030204" pitchFamily="49" charset="0"/>
+              </a:rPr>
+              <a:t>updated_chargelist</a:t>
+            </a:r>
+            <a:r>
+              <a:rPr lang="en-US">
+                <a:solidFill>
+                  <a:srgbClr val="CCCCCC"/>
+                </a:solidFill>
+                <a:latin typeface="Consolas" panose="020B0609020204030204" pitchFamily="49" charset="0"/>
+              </a:rPr>
+              <a:t>: shifts m1 charges</a:t>
+            </a:r>
+            <a:endParaRPr lang="en-US" sz="1800"/>
+          </a:p>
+          <a:p>
+            <a:r>
+              <a:rPr lang="en-US" sz="1800"/>
+              <a:t>    ------------------------------</a:t>
+            </a:r>
+          </a:p>
+          <a:p>
+            <a:r>
+              <a:rPr lang="en-US" sz="1800"/>
+              <a:t>    '''</a:t>
+            </a:r>
+          </a:p>
+        </p:txBody>
+      </p:sp>
+    </p:spTree>
+    <p:extLst>
+      <p:ext uri="{BB962C8B-B14F-4D97-AF65-F5344CB8AC3E}">
+        <p14:creationId xmlns:p14="http://schemas.microsoft.com/office/powerpoint/2010/main" val="71479732"/>
+      </p:ext>
+    </p:extLst>
+  </p:cSld>
+  <p:clrMapOvr>
+    <a:masterClrMapping/>
+  </p:clrMapOvr>
+</p:sld>
+</file>
+
+<file path=ppt/slides/slide72.xml><?xml version="1.0" encoding="utf-8"?>
+<p:sld xmlns:a="http://schemas.openxmlformats.org/drawingml/2006/main" xmlns:r="http://schemas.openxmlformats.org/officeDocument/2006/relationships" xmlns:p="http://schemas.openxmlformats.org/presentationml/2006/main">
+  <p:cSld>
+    <p:spTree>
+      <p:nvGrpSpPr>
+        <p:cNvPr id="1" name="">
+          <a:extLst>
+            <a:ext uri="{FF2B5EF4-FFF2-40B4-BE49-F238E27FC236}">
+              <a16:creationId xmlns:a16="http://schemas.microsoft.com/office/drawing/2014/main" id="{E8C5F460-6860-1662-11D2-E3FAC08081A0}"/>
+            </a:ext>
+          </a:extLst>
+        </p:cNvPr>
+        <p:cNvGrpSpPr/>
+        <p:nvPr/>
+      </p:nvGrpSpPr>
+      <p:grpSpPr>
+        <a:xfrm>
+          <a:off x="0" y="0"/>
+          <a:ext cx="0" cy="0"/>
+          <a:chOff x="0" y="0"/>
+          <a:chExt cx="0" cy="0"/>
+        </a:xfrm>
+      </p:grpSpPr>
+      <p:sp>
+        <p:nvSpPr>
+          <p:cNvPr id="2" name="Titel 1">
+            <a:extLst>
+              <a:ext uri="{FF2B5EF4-FFF2-40B4-BE49-F238E27FC236}">
+                <a16:creationId xmlns:a16="http://schemas.microsoft.com/office/drawing/2014/main" id="{044651A3-A14E-566C-DF6E-341C3D263BF0}"/>
+              </a:ext>
+            </a:extLst>
+          </p:cNvPr>
+          <p:cNvSpPr>
+            <a:spLocks noGrp="1"/>
+          </p:cNvSpPr>
+          <p:nvPr>
+            <p:ph type="title"/>
+          </p:nvPr>
+        </p:nvSpPr>
+        <p:spPr>
+          <a:xfrm>
+            <a:off x="838200" y="365126"/>
+            <a:ext cx="10515600" cy="558800"/>
+          </a:xfrm>
+        </p:spPr>
+        <p:txBody>
+          <a:bodyPr>
+            <a:normAutofit/>
+          </a:bodyPr>
+          <a:lstStyle/>
+          <a:p>
+            <a:r>
+              <a:rPr lang="en-US" sz="2000"/>
+              <a:t>prepare_pcf_for_shift.py</a:t>
+            </a:r>
+          </a:p>
+        </p:txBody>
+      </p:sp>
+      <p:sp>
+        <p:nvSpPr>
+          <p:cNvPr id="5" name="Textfeld 4">
+            <a:extLst>
+              <a:ext uri="{FF2B5EF4-FFF2-40B4-BE49-F238E27FC236}">
+                <a16:creationId xmlns:a16="http://schemas.microsoft.com/office/drawing/2014/main" id="{4166B669-F968-9DFB-0873-EEC173E8B64B}"/>
+              </a:ext>
+            </a:extLst>
+          </p:cNvPr>
+          <p:cNvSpPr txBox="1"/>
+          <p:nvPr/>
+        </p:nvSpPr>
+        <p:spPr>
+          <a:xfrm>
+            <a:off x="838200" y="1048435"/>
+            <a:ext cx="6096000" cy="4524315"/>
+          </a:xfrm>
+          <a:prstGeom prst="rect">
+            <a:avLst/>
+          </a:prstGeom>
+          <a:noFill/>
+        </p:spPr>
+        <p:txBody>
+          <a:bodyPr wrap="square">
+            <a:spAutoFit/>
+          </a:bodyPr>
+          <a:lstStyle/>
+          <a:p>
+            <a:r>
+              <a:rPr lang="en-US" sz="1800"/>
+              <a:t>dupli</a:t>
+            </a:r>
+          </a:p>
+          <a:p>
+            <a:r>
+              <a:rPr lang="en-US" sz="1800"/>
+              <a:t>    '''</a:t>
+            </a:r>
+          </a:p>
+          <a:p>
+            <a:r>
+              <a:rPr lang="en-US" sz="1800"/>
+              <a:t>    ------------------------------</a:t>
+            </a:r>
+          </a:p>
+          <a:p>
+            <a:r>
+              <a:rPr lang="en-US" sz="1800"/>
+              <a:t>    EFFECT: \\</a:t>
+            </a:r>
+          </a:p>
+          <a:p>
+            <a:r>
+              <a:rPr lang="en-US" sz="1800"/>
+              <a:t>    --------------- </a:t>
+            </a:r>
+          </a:p>
+          <a:p>
+            <a:r>
+              <a:rPr lang="en-US" sz="1800"/>
+              <a:t>    XX</a:t>
+            </a:r>
+          </a:p>
+          <a:p>
+            <a:r>
+              <a:rPr lang="en-US" sz="1800"/>
+              <a:t>    ------------------------------</a:t>
+            </a:r>
+          </a:p>
+          <a:p>
+            <a:r>
+              <a:rPr lang="en-US" sz="1800"/>
+              <a:t>    INPUT: \\</a:t>
+            </a:r>
+          </a:p>
+          <a:p>
+            <a:r>
+              <a:rPr lang="en-US" sz="1800"/>
+              <a:t>    --------------- </a:t>
+            </a:r>
+          </a:p>
+          <a:p>
+            <a:r>
+              <a:rPr lang="en-US" sz="1800"/>
+              <a:t>    </a:t>
+            </a:r>
+          </a:p>
+          <a:p>
+            <a:r>
+              <a:rPr lang="en-US" sz="1800"/>
+              <a:t>    ------------------------------</a:t>
+            </a:r>
+          </a:p>
+          <a:p>
+            <a:r>
+              <a:rPr lang="en-US" sz="1800"/>
+              <a:t>    RETURN: \\</a:t>
+            </a:r>
+          </a:p>
+          <a:p>
+            <a:r>
+              <a:rPr lang="en-US" sz="1800"/>
+              <a:t>    --------------- </a:t>
+            </a:r>
+          </a:p>
+          <a:p>
+            <a:r>
+              <a:rPr lang="en-US"/>
+              <a:t>    </a:t>
+            </a:r>
+            <a:endParaRPr lang="en-US" sz="1800"/>
+          </a:p>
+          <a:p>
+            <a:r>
+              <a:rPr lang="en-US" sz="1800"/>
+              <a:t>    ------------------------------</a:t>
+            </a:r>
+          </a:p>
+          <a:p>
+            <a:r>
+              <a:rPr lang="en-US" sz="1800"/>
+              <a:t>    '''</a:t>
+            </a:r>
+          </a:p>
+        </p:txBody>
+      </p:sp>
+    </p:spTree>
+    <p:extLst>
+      <p:ext uri="{BB962C8B-B14F-4D97-AF65-F5344CB8AC3E}">
+        <p14:creationId xmlns:p14="http://schemas.microsoft.com/office/powerpoint/2010/main" val="857013897"/>
       </p:ext>
     </p:extLst>
   </p:cSld>

</xml_diff>